<commit_message>
erste version der Lernkarten, 4 Stunden
</commit_message>
<xml_diff>
--- a/Lernkarten/Level1 - Einführung.pptx
+++ b/Lernkarten/Level1 - Einführung.pptx
@@ -203,7 +203,7 @@
           <a:p>
             <a:fld id="{DD7A25D8-F173-4133-85F8-CB962D678EB5}" type="datetimeFigureOut">
               <a:rPr lang="de-DE" smtClean="0"/>
-              <a:t>21.12.21</a:t>
+              <a:t>22.12.21</a:t>
             </a:fld>
             <a:endParaRPr lang="de-DE"/>
           </a:p>
@@ -609,7 +609,7 @@
           <a:p>
             <a:fld id="{FC9269F9-6F79-4414-A84E-D81C6C443C37}" type="datetimeFigureOut">
               <a:rPr lang="de-DE" smtClean="0"/>
-              <a:t>21.12.21</a:t>
+              <a:t>22.12.21</a:t>
             </a:fld>
             <a:endParaRPr lang="de-DE"/>
           </a:p>
@@ -2693,6 +2693,802 @@
       </p:grpSpPr>
       <p:sp>
         <p:nvSpPr>
+          <p:cNvPr id="12" name="Rechteck 11">
+            <a:extLst>
+              <a:ext uri="{FF2B5EF4-FFF2-40B4-BE49-F238E27FC236}">
+                <a16:creationId xmlns:a16="http://schemas.microsoft.com/office/drawing/2014/main" id="{F70C2582-69B9-7641-AE9E-DB3614253300}"/>
+              </a:ext>
+            </a:extLst>
+          </p:cNvPr>
+          <p:cNvSpPr/>
+          <p:nvPr userDrawn="1"/>
+        </p:nvSpPr>
+        <p:spPr>
+          <a:xfrm>
+            <a:off x="320040" y="296810"/>
+            <a:ext cx="6217474" cy="6632628"/>
+          </a:xfrm>
+          <a:custGeom>
+            <a:avLst/>
+            <a:gdLst>
+              <a:gd name="connsiteX0" fmla="*/ 0 w 6217474"/>
+              <a:gd name="connsiteY0" fmla="*/ 0 h 6632628"/>
+              <a:gd name="connsiteX1" fmla="*/ 627400 w 6217474"/>
+              <a:gd name="connsiteY1" fmla="*/ 0 h 6632628"/>
+              <a:gd name="connsiteX2" fmla="*/ 1254799 w 6217474"/>
+              <a:gd name="connsiteY2" fmla="*/ 0 h 6632628"/>
+              <a:gd name="connsiteX3" fmla="*/ 1882199 w 6217474"/>
+              <a:gd name="connsiteY3" fmla="*/ 0 h 6632628"/>
+              <a:gd name="connsiteX4" fmla="*/ 2509599 w 6217474"/>
+              <a:gd name="connsiteY4" fmla="*/ 0 h 6632628"/>
+              <a:gd name="connsiteX5" fmla="*/ 3199173 w 6217474"/>
+              <a:gd name="connsiteY5" fmla="*/ 0 h 6632628"/>
+              <a:gd name="connsiteX6" fmla="*/ 3764398 w 6217474"/>
+              <a:gd name="connsiteY6" fmla="*/ 0 h 6632628"/>
+              <a:gd name="connsiteX7" fmla="*/ 4391798 w 6217474"/>
+              <a:gd name="connsiteY7" fmla="*/ 0 h 6632628"/>
+              <a:gd name="connsiteX8" fmla="*/ 4957022 w 6217474"/>
+              <a:gd name="connsiteY8" fmla="*/ 0 h 6632628"/>
+              <a:gd name="connsiteX9" fmla="*/ 5522247 w 6217474"/>
+              <a:gd name="connsiteY9" fmla="*/ 0 h 6632628"/>
+              <a:gd name="connsiteX10" fmla="*/ 6217474 w 6217474"/>
+              <a:gd name="connsiteY10" fmla="*/ 0 h 6632628"/>
+              <a:gd name="connsiteX11" fmla="*/ 6217474 w 6217474"/>
+              <a:gd name="connsiteY11" fmla="*/ 353740 h 6632628"/>
+              <a:gd name="connsiteX12" fmla="*/ 6217474 w 6217474"/>
+              <a:gd name="connsiteY12" fmla="*/ 972785 h 6632628"/>
+              <a:gd name="connsiteX13" fmla="*/ 6217474 w 6217474"/>
+              <a:gd name="connsiteY13" fmla="*/ 1392852 h 6632628"/>
+              <a:gd name="connsiteX14" fmla="*/ 6217474 w 6217474"/>
+              <a:gd name="connsiteY14" fmla="*/ 2011897 h 6632628"/>
+              <a:gd name="connsiteX15" fmla="*/ 6217474 w 6217474"/>
+              <a:gd name="connsiteY15" fmla="*/ 2498290 h 6632628"/>
+              <a:gd name="connsiteX16" fmla="*/ 6217474 w 6217474"/>
+              <a:gd name="connsiteY16" fmla="*/ 2918356 h 6632628"/>
+              <a:gd name="connsiteX17" fmla="*/ 6217474 w 6217474"/>
+              <a:gd name="connsiteY17" fmla="*/ 3272096 h 6632628"/>
+              <a:gd name="connsiteX18" fmla="*/ 6217474 w 6217474"/>
+              <a:gd name="connsiteY18" fmla="*/ 3692163 h 6632628"/>
+              <a:gd name="connsiteX19" fmla="*/ 6217474 w 6217474"/>
+              <a:gd name="connsiteY19" fmla="*/ 4112229 h 6632628"/>
+              <a:gd name="connsiteX20" fmla="*/ 6217474 w 6217474"/>
+              <a:gd name="connsiteY20" fmla="*/ 4664948 h 6632628"/>
+              <a:gd name="connsiteX21" fmla="*/ 6217474 w 6217474"/>
+              <a:gd name="connsiteY21" fmla="*/ 5217667 h 6632628"/>
+              <a:gd name="connsiteX22" fmla="*/ 6217474 w 6217474"/>
+              <a:gd name="connsiteY22" fmla="*/ 5704060 h 6632628"/>
+              <a:gd name="connsiteX23" fmla="*/ 6217474 w 6217474"/>
+              <a:gd name="connsiteY23" fmla="*/ 6632628 h 6632628"/>
+              <a:gd name="connsiteX24" fmla="*/ 5776599 w 6217474"/>
+              <a:gd name="connsiteY24" fmla="*/ 6632628 h 6632628"/>
+              <a:gd name="connsiteX25" fmla="*/ 5211374 w 6217474"/>
+              <a:gd name="connsiteY25" fmla="*/ 6632628 h 6632628"/>
+              <a:gd name="connsiteX26" fmla="*/ 4583974 w 6217474"/>
+              <a:gd name="connsiteY26" fmla="*/ 6632628 h 6632628"/>
+              <a:gd name="connsiteX27" fmla="*/ 4205273 w 6217474"/>
+              <a:gd name="connsiteY27" fmla="*/ 6632628 h 6632628"/>
+              <a:gd name="connsiteX28" fmla="*/ 3515699 w 6217474"/>
+              <a:gd name="connsiteY28" fmla="*/ 6632628 h 6632628"/>
+              <a:gd name="connsiteX29" fmla="*/ 3012649 w 6217474"/>
+              <a:gd name="connsiteY29" fmla="*/ 6632628 h 6632628"/>
+              <a:gd name="connsiteX30" fmla="*/ 2385249 w 6217474"/>
+              <a:gd name="connsiteY30" fmla="*/ 6632628 h 6632628"/>
+              <a:gd name="connsiteX31" fmla="*/ 2006548 w 6217474"/>
+              <a:gd name="connsiteY31" fmla="*/ 6632628 h 6632628"/>
+              <a:gd name="connsiteX32" fmla="*/ 1316974 w 6217474"/>
+              <a:gd name="connsiteY32" fmla="*/ 6632628 h 6632628"/>
+              <a:gd name="connsiteX33" fmla="*/ 813924 w 6217474"/>
+              <a:gd name="connsiteY33" fmla="*/ 6632628 h 6632628"/>
+              <a:gd name="connsiteX34" fmla="*/ 0 w 6217474"/>
+              <a:gd name="connsiteY34" fmla="*/ 6632628 h 6632628"/>
+              <a:gd name="connsiteX35" fmla="*/ 0 w 6217474"/>
+              <a:gd name="connsiteY35" fmla="*/ 6212562 h 6632628"/>
+              <a:gd name="connsiteX36" fmla="*/ 0 w 6217474"/>
+              <a:gd name="connsiteY36" fmla="*/ 5527190 h 6632628"/>
+              <a:gd name="connsiteX37" fmla="*/ 0 w 6217474"/>
+              <a:gd name="connsiteY37" fmla="*/ 5173450 h 6632628"/>
+              <a:gd name="connsiteX38" fmla="*/ 0 w 6217474"/>
+              <a:gd name="connsiteY38" fmla="*/ 4620731 h 6632628"/>
+              <a:gd name="connsiteX39" fmla="*/ 0 w 6217474"/>
+              <a:gd name="connsiteY39" fmla="*/ 4266991 h 6632628"/>
+              <a:gd name="connsiteX40" fmla="*/ 0 w 6217474"/>
+              <a:gd name="connsiteY40" fmla="*/ 3647945 h 6632628"/>
+              <a:gd name="connsiteX41" fmla="*/ 0 w 6217474"/>
+              <a:gd name="connsiteY41" fmla="*/ 3095226 h 6632628"/>
+              <a:gd name="connsiteX42" fmla="*/ 0 w 6217474"/>
+              <a:gd name="connsiteY42" fmla="*/ 2476181 h 6632628"/>
+              <a:gd name="connsiteX43" fmla="*/ 0 w 6217474"/>
+              <a:gd name="connsiteY43" fmla="*/ 1923462 h 6632628"/>
+              <a:gd name="connsiteX44" fmla="*/ 0 w 6217474"/>
+              <a:gd name="connsiteY44" fmla="*/ 1304417 h 6632628"/>
+              <a:gd name="connsiteX45" fmla="*/ 0 w 6217474"/>
+              <a:gd name="connsiteY45" fmla="*/ 685372 h 6632628"/>
+              <a:gd name="connsiteX46" fmla="*/ 0 w 6217474"/>
+              <a:gd name="connsiteY46" fmla="*/ 0 h 6632628"/>
+            </a:gdLst>
+            <a:ahLst/>
+            <a:cxnLst>
+              <a:cxn ang="0">
+                <a:pos x="connsiteX0" y="connsiteY0"/>
+              </a:cxn>
+              <a:cxn ang="0">
+                <a:pos x="connsiteX1" y="connsiteY1"/>
+              </a:cxn>
+              <a:cxn ang="0">
+                <a:pos x="connsiteX2" y="connsiteY2"/>
+              </a:cxn>
+              <a:cxn ang="0">
+                <a:pos x="connsiteX3" y="connsiteY3"/>
+              </a:cxn>
+              <a:cxn ang="0">
+                <a:pos x="connsiteX4" y="connsiteY4"/>
+              </a:cxn>
+              <a:cxn ang="0">
+                <a:pos x="connsiteX5" y="connsiteY5"/>
+              </a:cxn>
+              <a:cxn ang="0">
+                <a:pos x="connsiteX6" y="connsiteY6"/>
+              </a:cxn>
+              <a:cxn ang="0">
+                <a:pos x="connsiteX7" y="connsiteY7"/>
+              </a:cxn>
+              <a:cxn ang="0">
+                <a:pos x="connsiteX8" y="connsiteY8"/>
+              </a:cxn>
+              <a:cxn ang="0">
+                <a:pos x="connsiteX9" y="connsiteY9"/>
+              </a:cxn>
+              <a:cxn ang="0">
+                <a:pos x="connsiteX10" y="connsiteY10"/>
+              </a:cxn>
+              <a:cxn ang="0">
+                <a:pos x="connsiteX11" y="connsiteY11"/>
+              </a:cxn>
+              <a:cxn ang="0">
+                <a:pos x="connsiteX12" y="connsiteY12"/>
+              </a:cxn>
+              <a:cxn ang="0">
+                <a:pos x="connsiteX13" y="connsiteY13"/>
+              </a:cxn>
+              <a:cxn ang="0">
+                <a:pos x="connsiteX14" y="connsiteY14"/>
+              </a:cxn>
+              <a:cxn ang="0">
+                <a:pos x="connsiteX15" y="connsiteY15"/>
+              </a:cxn>
+              <a:cxn ang="0">
+                <a:pos x="connsiteX16" y="connsiteY16"/>
+              </a:cxn>
+              <a:cxn ang="0">
+                <a:pos x="connsiteX17" y="connsiteY17"/>
+              </a:cxn>
+              <a:cxn ang="0">
+                <a:pos x="connsiteX18" y="connsiteY18"/>
+              </a:cxn>
+              <a:cxn ang="0">
+                <a:pos x="connsiteX19" y="connsiteY19"/>
+              </a:cxn>
+              <a:cxn ang="0">
+                <a:pos x="connsiteX20" y="connsiteY20"/>
+              </a:cxn>
+              <a:cxn ang="0">
+                <a:pos x="connsiteX21" y="connsiteY21"/>
+              </a:cxn>
+              <a:cxn ang="0">
+                <a:pos x="connsiteX22" y="connsiteY22"/>
+              </a:cxn>
+              <a:cxn ang="0">
+                <a:pos x="connsiteX23" y="connsiteY23"/>
+              </a:cxn>
+              <a:cxn ang="0">
+                <a:pos x="connsiteX24" y="connsiteY24"/>
+              </a:cxn>
+              <a:cxn ang="0">
+                <a:pos x="connsiteX25" y="connsiteY25"/>
+              </a:cxn>
+              <a:cxn ang="0">
+                <a:pos x="connsiteX26" y="connsiteY26"/>
+              </a:cxn>
+              <a:cxn ang="0">
+                <a:pos x="connsiteX27" y="connsiteY27"/>
+              </a:cxn>
+              <a:cxn ang="0">
+                <a:pos x="connsiteX28" y="connsiteY28"/>
+              </a:cxn>
+              <a:cxn ang="0">
+                <a:pos x="connsiteX29" y="connsiteY29"/>
+              </a:cxn>
+              <a:cxn ang="0">
+                <a:pos x="connsiteX30" y="connsiteY30"/>
+              </a:cxn>
+              <a:cxn ang="0">
+                <a:pos x="connsiteX31" y="connsiteY31"/>
+              </a:cxn>
+              <a:cxn ang="0">
+                <a:pos x="connsiteX32" y="connsiteY32"/>
+              </a:cxn>
+              <a:cxn ang="0">
+                <a:pos x="connsiteX33" y="connsiteY33"/>
+              </a:cxn>
+              <a:cxn ang="0">
+                <a:pos x="connsiteX34" y="connsiteY34"/>
+              </a:cxn>
+              <a:cxn ang="0">
+                <a:pos x="connsiteX35" y="connsiteY35"/>
+              </a:cxn>
+              <a:cxn ang="0">
+                <a:pos x="connsiteX36" y="connsiteY36"/>
+              </a:cxn>
+              <a:cxn ang="0">
+                <a:pos x="connsiteX37" y="connsiteY37"/>
+              </a:cxn>
+              <a:cxn ang="0">
+                <a:pos x="connsiteX38" y="connsiteY38"/>
+              </a:cxn>
+              <a:cxn ang="0">
+                <a:pos x="connsiteX39" y="connsiteY39"/>
+              </a:cxn>
+              <a:cxn ang="0">
+                <a:pos x="connsiteX40" y="connsiteY40"/>
+              </a:cxn>
+              <a:cxn ang="0">
+                <a:pos x="connsiteX41" y="connsiteY41"/>
+              </a:cxn>
+              <a:cxn ang="0">
+                <a:pos x="connsiteX42" y="connsiteY42"/>
+              </a:cxn>
+              <a:cxn ang="0">
+                <a:pos x="connsiteX43" y="connsiteY43"/>
+              </a:cxn>
+              <a:cxn ang="0">
+                <a:pos x="connsiteX44" y="connsiteY44"/>
+              </a:cxn>
+              <a:cxn ang="0">
+                <a:pos x="connsiteX45" y="connsiteY45"/>
+              </a:cxn>
+              <a:cxn ang="0">
+                <a:pos x="connsiteX46" y="connsiteY46"/>
+              </a:cxn>
+            </a:cxnLst>
+            <a:rect l="l" t="t" r="r" b="b"/>
+            <a:pathLst>
+              <a:path w="6217474" h="6632628" fill="none" extrusionOk="0">
+                <a:moveTo>
+                  <a:pt x="0" y="0"/>
+                </a:moveTo>
+                <a:cubicBezTo>
+                  <a:pt x="129095" y="-70785"/>
+                  <a:pt x="492651" y="34272"/>
+                  <a:pt x="627400" y="0"/>
+                </a:cubicBezTo>
+                <a:cubicBezTo>
+                  <a:pt x="762149" y="-34272"/>
+                  <a:pt x="1113327" y="36505"/>
+                  <a:pt x="1254799" y="0"/>
+                </a:cubicBezTo>
+                <a:cubicBezTo>
+                  <a:pt x="1396271" y="-36505"/>
+                  <a:pt x="1735601" y="40389"/>
+                  <a:pt x="1882199" y="0"/>
+                </a:cubicBezTo>
+                <a:cubicBezTo>
+                  <a:pt x="2028797" y="-40389"/>
+                  <a:pt x="2339449" y="41519"/>
+                  <a:pt x="2509599" y="0"/>
+                </a:cubicBezTo>
+                <a:cubicBezTo>
+                  <a:pt x="2679749" y="-41519"/>
+                  <a:pt x="2979200" y="28336"/>
+                  <a:pt x="3199173" y="0"/>
+                </a:cubicBezTo>
+                <a:cubicBezTo>
+                  <a:pt x="3419146" y="-28336"/>
+                  <a:pt x="3632483" y="7531"/>
+                  <a:pt x="3764398" y="0"/>
+                </a:cubicBezTo>
+                <a:cubicBezTo>
+                  <a:pt x="3896314" y="-7531"/>
+                  <a:pt x="4229855" y="53997"/>
+                  <a:pt x="4391798" y="0"/>
+                </a:cubicBezTo>
+                <a:cubicBezTo>
+                  <a:pt x="4553741" y="-53997"/>
+                  <a:pt x="4694499" y="57077"/>
+                  <a:pt x="4957022" y="0"/>
+                </a:cubicBezTo>
+                <a:cubicBezTo>
+                  <a:pt x="5219545" y="-57077"/>
+                  <a:pt x="5292112" y="16646"/>
+                  <a:pt x="5522247" y="0"/>
+                </a:cubicBezTo>
+                <a:cubicBezTo>
+                  <a:pt x="5752383" y="-16646"/>
+                  <a:pt x="5991968" y="69899"/>
+                  <a:pt x="6217474" y="0"/>
+                </a:cubicBezTo>
+                <a:cubicBezTo>
+                  <a:pt x="6242991" y="171539"/>
+                  <a:pt x="6190920" y="251190"/>
+                  <a:pt x="6217474" y="353740"/>
+                </a:cubicBezTo>
+                <a:cubicBezTo>
+                  <a:pt x="6244028" y="456290"/>
+                  <a:pt x="6161284" y="771150"/>
+                  <a:pt x="6217474" y="972785"/>
+                </a:cubicBezTo>
+                <a:cubicBezTo>
+                  <a:pt x="6273664" y="1174421"/>
+                  <a:pt x="6212529" y="1287822"/>
+                  <a:pt x="6217474" y="1392852"/>
+                </a:cubicBezTo>
+                <a:cubicBezTo>
+                  <a:pt x="6222419" y="1497882"/>
+                  <a:pt x="6146070" y="1723833"/>
+                  <a:pt x="6217474" y="2011897"/>
+                </a:cubicBezTo>
+                <a:cubicBezTo>
+                  <a:pt x="6288878" y="2299961"/>
+                  <a:pt x="6172054" y="2374487"/>
+                  <a:pt x="6217474" y="2498290"/>
+                </a:cubicBezTo>
+                <a:cubicBezTo>
+                  <a:pt x="6262894" y="2622093"/>
+                  <a:pt x="6205099" y="2806755"/>
+                  <a:pt x="6217474" y="2918356"/>
+                </a:cubicBezTo>
+                <a:cubicBezTo>
+                  <a:pt x="6229849" y="3029957"/>
+                  <a:pt x="6176628" y="3135951"/>
+                  <a:pt x="6217474" y="3272096"/>
+                </a:cubicBezTo>
+                <a:cubicBezTo>
+                  <a:pt x="6258320" y="3408241"/>
+                  <a:pt x="6205980" y="3588904"/>
+                  <a:pt x="6217474" y="3692163"/>
+                </a:cubicBezTo>
+                <a:cubicBezTo>
+                  <a:pt x="6228968" y="3795422"/>
+                  <a:pt x="6191352" y="3918820"/>
+                  <a:pt x="6217474" y="4112229"/>
+                </a:cubicBezTo>
+                <a:cubicBezTo>
+                  <a:pt x="6243596" y="4305638"/>
+                  <a:pt x="6177910" y="4448066"/>
+                  <a:pt x="6217474" y="4664948"/>
+                </a:cubicBezTo>
+                <a:cubicBezTo>
+                  <a:pt x="6257038" y="4881830"/>
+                  <a:pt x="6187298" y="5049479"/>
+                  <a:pt x="6217474" y="5217667"/>
+                </a:cubicBezTo>
+                <a:cubicBezTo>
+                  <a:pt x="6247650" y="5385855"/>
+                  <a:pt x="6167825" y="5537301"/>
+                  <a:pt x="6217474" y="5704060"/>
+                </a:cubicBezTo>
+                <a:cubicBezTo>
+                  <a:pt x="6267123" y="5870819"/>
+                  <a:pt x="6121125" y="6304203"/>
+                  <a:pt x="6217474" y="6632628"/>
+                </a:cubicBezTo>
+                <a:cubicBezTo>
+                  <a:pt x="5999449" y="6672964"/>
+                  <a:pt x="5918694" y="6601110"/>
+                  <a:pt x="5776599" y="6632628"/>
+                </a:cubicBezTo>
+                <a:cubicBezTo>
+                  <a:pt x="5634504" y="6664146"/>
+                  <a:pt x="5471618" y="6585495"/>
+                  <a:pt x="5211374" y="6632628"/>
+                </a:cubicBezTo>
+                <a:cubicBezTo>
+                  <a:pt x="4951130" y="6679761"/>
+                  <a:pt x="4896425" y="6566969"/>
+                  <a:pt x="4583974" y="6632628"/>
+                </a:cubicBezTo>
+                <a:cubicBezTo>
+                  <a:pt x="4271523" y="6698287"/>
+                  <a:pt x="4368621" y="6618300"/>
+                  <a:pt x="4205273" y="6632628"/>
+                </a:cubicBezTo>
+                <a:cubicBezTo>
+                  <a:pt x="4041925" y="6646956"/>
+                  <a:pt x="3808504" y="6608732"/>
+                  <a:pt x="3515699" y="6632628"/>
+                </a:cubicBezTo>
+                <a:cubicBezTo>
+                  <a:pt x="3222894" y="6656524"/>
+                  <a:pt x="3173937" y="6578861"/>
+                  <a:pt x="3012649" y="6632628"/>
+                </a:cubicBezTo>
+                <a:cubicBezTo>
+                  <a:pt x="2851361" y="6686395"/>
+                  <a:pt x="2602155" y="6590602"/>
+                  <a:pt x="2385249" y="6632628"/>
+                </a:cubicBezTo>
+                <a:cubicBezTo>
+                  <a:pt x="2168343" y="6674654"/>
+                  <a:pt x="2186742" y="6610681"/>
+                  <a:pt x="2006548" y="6632628"/>
+                </a:cubicBezTo>
+                <a:cubicBezTo>
+                  <a:pt x="1826354" y="6654575"/>
+                  <a:pt x="1639933" y="6596891"/>
+                  <a:pt x="1316974" y="6632628"/>
+                </a:cubicBezTo>
+                <a:cubicBezTo>
+                  <a:pt x="994015" y="6668365"/>
+                  <a:pt x="992259" y="6614720"/>
+                  <a:pt x="813924" y="6632628"/>
+                </a:cubicBezTo>
+                <a:cubicBezTo>
+                  <a:pt x="635589" y="6650536"/>
+                  <a:pt x="246265" y="6535779"/>
+                  <a:pt x="0" y="6632628"/>
+                </a:cubicBezTo>
+                <a:cubicBezTo>
+                  <a:pt x="-44359" y="6448997"/>
+                  <a:pt x="4673" y="6391176"/>
+                  <a:pt x="0" y="6212562"/>
+                </a:cubicBezTo>
+                <a:cubicBezTo>
+                  <a:pt x="-4673" y="6033948"/>
+                  <a:pt x="64532" y="5721648"/>
+                  <a:pt x="0" y="5527190"/>
+                </a:cubicBezTo>
+                <a:cubicBezTo>
+                  <a:pt x="-64532" y="5332732"/>
+                  <a:pt x="36773" y="5321256"/>
+                  <a:pt x="0" y="5173450"/>
+                </a:cubicBezTo>
+                <a:cubicBezTo>
+                  <a:pt x="-36773" y="5025644"/>
+                  <a:pt x="10572" y="4741713"/>
+                  <a:pt x="0" y="4620731"/>
+                </a:cubicBezTo>
+                <a:cubicBezTo>
+                  <a:pt x="-10572" y="4499749"/>
+                  <a:pt x="7711" y="4387684"/>
+                  <a:pt x="0" y="4266991"/>
+                </a:cubicBezTo>
+                <a:cubicBezTo>
+                  <a:pt x="-7711" y="4146298"/>
+                  <a:pt x="10558" y="3929494"/>
+                  <a:pt x="0" y="3647945"/>
+                </a:cubicBezTo>
+                <a:cubicBezTo>
+                  <a:pt x="-10558" y="3366396"/>
+                  <a:pt x="2355" y="3340868"/>
+                  <a:pt x="0" y="3095226"/>
+                </a:cubicBezTo>
+                <a:cubicBezTo>
+                  <a:pt x="-2355" y="2849584"/>
+                  <a:pt x="44504" y="2743654"/>
+                  <a:pt x="0" y="2476181"/>
+                </a:cubicBezTo>
+                <a:cubicBezTo>
+                  <a:pt x="-44504" y="2208708"/>
+                  <a:pt x="10485" y="2034460"/>
+                  <a:pt x="0" y="1923462"/>
+                </a:cubicBezTo>
+                <a:cubicBezTo>
+                  <a:pt x="-10485" y="1812464"/>
+                  <a:pt x="56670" y="1526227"/>
+                  <a:pt x="0" y="1304417"/>
+                </a:cubicBezTo>
+                <a:cubicBezTo>
+                  <a:pt x="-56670" y="1082607"/>
+                  <a:pt x="39678" y="972589"/>
+                  <a:pt x="0" y="685372"/>
+                </a:cubicBezTo>
+                <a:cubicBezTo>
+                  <a:pt x="-39678" y="398155"/>
+                  <a:pt x="72578" y="305580"/>
+                  <a:pt x="0" y="0"/>
+                </a:cubicBezTo>
+                <a:close/>
+              </a:path>
+              <a:path w="6217474" h="6632628" stroke="0" extrusionOk="0">
+                <a:moveTo>
+                  <a:pt x="0" y="0"/>
+                </a:moveTo>
+                <a:cubicBezTo>
+                  <a:pt x="226683" y="-37447"/>
+                  <a:pt x="325269" y="24359"/>
+                  <a:pt x="503050" y="0"/>
+                </a:cubicBezTo>
+                <a:cubicBezTo>
+                  <a:pt x="680831" y="-24359"/>
+                  <a:pt x="784789" y="4463"/>
+                  <a:pt x="881751" y="0"/>
+                </a:cubicBezTo>
+                <a:cubicBezTo>
+                  <a:pt x="978713" y="-4463"/>
+                  <a:pt x="1287131" y="22121"/>
+                  <a:pt x="1571325" y="0"/>
+                </a:cubicBezTo>
+                <a:cubicBezTo>
+                  <a:pt x="1855519" y="-22121"/>
+                  <a:pt x="1841943" y="5031"/>
+                  <a:pt x="2074375" y="0"/>
+                </a:cubicBezTo>
+                <a:cubicBezTo>
+                  <a:pt x="2306807" y="-5031"/>
+                  <a:pt x="2452818" y="23593"/>
+                  <a:pt x="2577426" y="0"/>
+                </a:cubicBezTo>
+                <a:cubicBezTo>
+                  <a:pt x="2702034" y="-23593"/>
+                  <a:pt x="2963608" y="65314"/>
+                  <a:pt x="3267000" y="0"/>
+                </a:cubicBezTo>
+                <a:cubicBezTo>
+                  <a:pt x="3570392" y="-65314"/>
+                  <a:pt x="3583846" y="6807"/>
+                  <a:pt x="3707875" y="0"/>
+                </a:cubicBezTo>
+                <a:cubicBezTo>
+                  <a:pt x="3831904" y="-6807"/>
+                  <a:pt x="4054408" y="41181"/>
+                  <a:pt x="4397450" y="0"/>
+                </a:cubicBezTo>
+                <a:cubicBezTo>
+                  <a:pt x="4740492" y="-41181"/>
+                  <a:pt x="4781103" y="49606"/>
+                  <a:pt x="5087024" y="0"/>
+                </a:cubicBezTo>
+                <a:cubicBezTo>
+                  <a:pt x="5392945" y="-49606"/>
+                  <a:pt x="5476370" y="54586"/>
+                  <a:pt x="5652249" y="0"/>
+                </a:cubicBezTo>
+                <a:cubicBezTo>
+                  <a:pt x="5828129" y="-54586"/>
+                  <a:pt x="6018164" y="4866"/>
+                  <a:pt x="6217474" y="0"/>
+                </a:cubicBezTo>
+                <a:cubicBezTo>
+                  <a:pt x="6246551" y="230141"/>
+                  <a:pt x="6215237" y="377743"/>
+                  <a:pt x="6217474" y="486393"/>
+                </a:cubicBezTo>
+                <a:cubicBezTo>
+                  <a:pt x="6219711" y="595043"/>
+                  <a:pt x="6190013" y="743427"/>
+                  <a:pt x="6217474" y="840133"/>
+                </a:cubicBezTo>
+                <a:cubicBezTo>
+                  <a:pt x="6244935" y="936839"/>
+                  <a:pt x="6216022" y="1143145"/>
+                  <a:pt x="6217474" y="1392852"/>
+                </a:cubicBezTo>
+                <a:cubicBezTo>
+                  <a:pt x="6218926" y="1642559"/>
+                  <a:pt x="6199092" y="1758149"/>
+                  <a:pt x="6217474" y="1945571"/>
+                </a:cubicBezTo>
+                <a:cubicBezTo>
+                  <a:pt x="6235856" y="2132993"/>
+                  <a:pt x="6167601" y="2261438"/>
+                  <a:pt x="6217474" y="2498290"/>
+                </a:cubicBezTo>
+                <a:cubicBezTo>
+                  <a:pt x="6267347" y="2735142"/>
+                  <a:pt x="6160410" y="2872407"/>
+                  <a:pt x="6217474" y="3117335"/>
+                </a:cubicBezTo>
+                <a:cubicBezTo>
+                  <a:pt x="6274538" y="3362263"/>
+                  <a:pt x="6212515" y="3427490"/>
+                  <a:pt x="6217474" y="3736380"/>
+                </a:cubicBezTo>
+                <a:cubicBezTo>
+                  <a:pt x="6222433" y="4045271"/>
+                  <a:pt x="6188885" y="4129879"/>
+                  <a:pt x="6217474" y="4355426"/>
+                </a:cubicBezTo>
+                <a:cubicBezTo>
+                  <a:pt x="6246063" y="4580973"/>
+                  <a:pt x="6191990" y="4599548"/>
+                  <a:pt x="6217474" y="4709166"/>
+                </a:cubicBezTo>
+                <a:cubicBezTo>
+                  <a:pt x="6242958" y="4818784"/>
+                  <a:pt x="6186952" y="5025465"/>
+                  <a:pt x="6217474" y="5129232"/>
+                </a:cubicBezTo>
+                <a:cubicBezTo>
+                  <a:pt x="6247996" y="5232999"/>
+                  <a:pt x="6217346" y="5564230"/>
+                  <a:pt x="6217474" y="5748278"/>
+                </a:cubicBezTo>
+                <a:cubicBezTo>
+                  <a:pt x="6217602" y="5932326"/>
+                  <a:pt x="6201759" y="6360748"/>
+                  <a:pt x="6217474" y="6632628"/>
+                </a:cubicBezTo>
+                <a:cubicBezTo>
+                  <a:pt x="6103624" y="6641523"/>
+                  <a:pt x="5908492" y="6614674"/>
+                  <a:pt x="5776599" y="6632628"/>
+                </a:cubicBezTo>
+                <a:cubicBezTo>
+                  <a:pt x="5644707" y="6650582"/>
+                  <a:pt x="5504611" y="6593361"/>
+                  <a:pt x="5397898" y="6632628"/>
+                </a:cubicBezTo>
+                <a:cubicBezTo>
+                  <a:pt x="5291185" y="6671895"/>
+                  <a:pt x="5159482" y="6611512"/>
+                  <a:pt x="5019197" y="6632628"/>
+                </a:cubicBezTo>
+                <a:cubicBezTo>
+                  <a:pt x="4878912" y="6653744"/>
+                  <a:pt x="4706165" y="6615605"/>
+                  <a:pt x="4453972" y="6632628"/>
+                </a:cubicBezTo>
+                <a:cubicBezTo>
+                  <a:pt x="4201780" y="6649651"/>
+                  <a:pt x="4133867" y="6598799"/>
+                  <a:pt x="4013097" y="6632628"/>
+                </a:cubicBezTo>
+                <a:cubicBezTo>
+                  <a:pt x="3892328" y="6666457"/>
+                  <a:pt x="3648049" y="6611731"/>
+                  <a:pt x="3385697" y="6632628"/>
+                </a:cubicBezTo>
+                <a:cubicBezTo>
+                  <a:pt x="3123345" y="6653525"/>
+                  <a:pt x="3156768" y="6597145"/>
+                  <a:pt x="2944822" y="6632628"/>
+                </a:cubicBezTo>
+                <a:cubicBezTo>
+                  <a:pt x="2732876" y="6668111"/>
+                  <a:pt x="2475972" y="6567270"/>
+                  <a:pt x="2317422" y="6632628"/>
+                </a:cubicBezTo>
+                <a:cubicBezTo>
+                  <a:pt x="2158872" y="6697986"/>
+                  <a:pt x="2021657" y="6597450"/>
+                  <a:pt x="1938721" y="6632628"/>
+                </a:cubicBezTo>
+                <a:cubicBezTo>
+                  <a:pt x="1855785" y="6667806"/>
+                  <a:pt x="1458699" y="6608943"/>
+                  <a:pt x="1311322" y="6632628"/>
+                </a:cubicBezTo>
+                <a:cubicBezTo>
+                  <a:pt x="1163945" y="6656313"/>
+                  <a:pt x="1005025" y="6630154"/>
+                  <a:pt x="870446" y="6632628"/>
+                </a:cubicBezTo>
+                <a:cubicBezTo>
+                  <a:pt x="735867" y="6635102"/>
+                  <a:pt x="580839" y="6595651"/>
+                  <a:pt x="491746" y="6632628"/>
+                </a:cubicBezTo>
+                <a:cubicBezTo>
+                  <a:pt x="402653" y="6669605"/>
+                  <a:pt x="184110" y="6614448"/>
+                  <a:pt x="0" y="6632628"/>
+                </a:cubicBezTo>
+                <a:cubicBezTo>
+                  <a:pt x="-30600" y="6496129"/>
+                  <a:pt x="54421" y="6203306"/>
+                  <a:pt x="0" y="6013583"/>
+                </a:cubicBezTo>
+                <a:cubicBezTo>
+                  <a:pt x="-54421" y="5823860"/>
+                  <a:pt x="25118" y="5791270"/>
+                  <a:pt x="0" y="5593516"/>
+                </a:cubicBezTo>
+                <a:cubicBezTo>
+                  <a:pt x="-25118" y="5395762"/>
+                  <a:pt x="21511" y="5318810"/>
+                  <a:pt x="0" y="5239776"/>
+                </a:cubicBezTo>
+                <a:cubicBezTo>
+                  <a:pt x="-21511" y="5160742"/>
+                  <a:pt x="19305" y="5027935"/>
+                  <a:pt x="0" y="4886036"/>
+                </a:cubicBezTo>
+                <a:cubicBezTo>
+                  <a:pt x="-19305" y="4744137"/>
+                  <a:pt x="40408" y="4414376"/>
+                  <a:pt x="0" y="4266991"/>
+                </a:cubicBezTo>
+                <a:cubicBezTo>
+                  <a:pt x="-40408" y="4119607"/>
+                  <a:pt x="11508" y="3985994"/>
+                  <a:pt x="0" y="3913251"/>
+                </a:cubicBezTo>
+                <a:cubicBezTo>
+                  <a:pt x="-11508" y="3840508"/>
+                  <a:pt x="38522" y="3554979"/>
+                  <a:pt x="0" y="3360532"/>
+                </a:cubicBezTo>
+                <a:cubicBezTo>
+                  <a:pt x="-38522" y="3166085"/>
+                  <a:pt x="45474" y="3110893"/>
+                  <a:pt x="0" y="2940465"/>
+                </a:cubicBezTo>
+                <a:cubicBezTo>
+                  <a:pt x="-45474" y="2770037"/>
+                  <a:pt x="50343" y="2538416"/>
+                  <a:pt x="0" y="2387746"/>
+                </a:cubicBezTo>
+                <a:cubicBezTo>
+                  <a:pt x="-50343" y="2237076"/>
+                  <a:pt x="32249" y="2059848"/>
+                  <a:pt x="0" y="1835027"/>
+                </a:cubicBezTo>
+                <a:cubicBezTo>
+                  <a:pt x="-32249" y="1610206"/>
+                  <a:pt x="12010" y="1532664"/>
+                  <a:pt x="0" y="1282308"/>
+                </a:cubicBezTo>
+                <a:cubicBezTo>
+                  <a:pt x="-12010" y="1031952"/>
+                  <a:pt x="47513" y="891308"/>
+                  <a:pt x="0" y="729589"/>
+                </a:cubicBezTo>
+                <a:cubicBezTo>
+                  <a:pt x="-47513" y="567870"/>
+                  <a:pt x="52267" y="210443"/>
+                  <a:pt x="0" y="0"/>
+                </a:cubicBezTo>
+                <a:close/>
+              </a:path>
+            </a:pathLst>
+          </a:custGeom>
+          <a:solidFill>
+            <a:schemeClr val="bg1"/>
+          </a:solidFill>
+          <a:ln w="38100">
+            <a:solidFill>
+              <a:schemeClr val="tx1"/>
+            </a:solidFill>
+            <a:extLst>
+              <a:ext uri="{C807C97D-BFC1-408E-A445-0C87EB9F89A2}">
+                <ask:lineSketchStyleProps xmlns:ask="http://schemas.microsoft.com/office/drawing/2018/sketchyshapes" sd="1219033472">
+                  <a:prstGeom prst="rect">
+                    <a:avLst/>
+                  </a:prstGeom>
+                  <ask:type>
+                    <ask:lineSketchScribble/>
+                  </ask:type>
+                </ask:lineSketchStyleProps>
+              </a:ext>
+            </a:extLst>
+          </a:ln>
+        </p:spPr>
+        <p:style>
+          <a:lnRef idx="2">
+            <a:schemeClr val="accent1">
+              <a:shade val="50000"/>
+            </a:schemeClr>
+          </a:lnRef>
+          <a:fillRef idx="1">
+            <a:schemeClr val="accent1"/>
+          </a:fillRef>
+          <a:effectRef idx="0">
+            <a:schemeClr val="accent1"/>
+          </a:effectRef>
+          <a:fontRef idx="minor">
+            <a:schemeClr val="lt1"/>
+          </a:fontRef>
+        </p:style>
+        <p:txBody>
+          <a:bodyPr rtlCol="0" anchor="ctr"/>
+          <a:lstStyle/>
+          <a:p>
+            <a:pPr algn="ctr"/>
+            <a:endParaRPr lang="de-DE" dirty="0"/>
+          </a:p>
+        </p:txBody>
+      </p:sp>
+      <p:sp>
+        <p:nvSpPr>
           <p:cNvPr id="9" name="Ellipse 8"/>
           <p:cNvSpPr/>
           <p:nvPr userDrawn="1"/>
@@ -3194,7 +3990,7 @@
           <a:p>
             <a:fld id="{FC9269F9-6F79-4414-A84E-D81C6C443C37}" type="datetimeFigureOut">
               <a:rPr lang="de-DE" smtClean="0"/>
-              <a:t>21.12.21</a:t>
+              <a:t>22.12.21</a:t>
             </a:fld>
             <a:endParaRPr lang="de-DE"/>
           </a:p>
@@ -3587,7 +4383,7 @@
           <a:p>
             <a:fld id="{FC9269F9-6F79-4414-A84E-D81C6C443C37}" type="datetimeFigureOut">
               <a:rPr lang="de-DE" smtClean="0"/>
-              <a:t>21.12.21</a:t>
+              <a:t>22.12.21</a:t>
             </a:fld>
             <a:endParaRPr lang="de-DE"/>
           </a:p>
@@ -4290,7 +5086,7 @@
         </p:nvSpPr>
         <p:spPr>
           <a:xfrm>
-            <a:off x="-465327" y="2430483"/>
+            <a:off x="-122427" y="3130571"/>
             <a:ext cx="6217474" cy="2522517"/>
           </a:xfrm>
         </p:spPr>
@@ -4366,8 +5162,8 @@
         </p:nvSpPr>
         <p:spPr>
           <a:xfrm>
-            <a:off x="227642" y="1019472"/>
-            <a:ext cx="6402715" cy="923330"/>
+            <a:off x="402369" y="1019472"/>
+            <a:ext cx="6053260" cy="923330"/>
           </a:xfrm>
           <a:prstGeom prst="rect">
             <a:avLst/>
@@ -4382,7 +5178,7 @@
           <a:p>
             <a:pPr algn="ctr"/>
             <a:r>
-              <a:rPr lang="de-DE" sz="5400" b="1" dirty="0">
+              <a:rPr lang="de-DE" sz="4400" b="1" dirty="0">
                 <a:ln w="12700">
                   <a:solidFill>
                     <a:schemeClr val="accent1"/>
@@ -4454,7 +5250,7 @@
         <p:spPr>
           <a:xfrm>
             <a:off x="95395" y="447973"/>
-            <a:ext cx="6667210" cy="707886"/>
+            <a:ext cx="6534962" cy="646331"/>
           </a:xfrm>
           <a:prstGeom prst="rect">
             <a:avLst/>
@@ -4462,14 +5258,14 @@
           <a:noFill/>
         </p:spPr>
         <p:txBody>
-          <a:bodyPr wrap="none" lIns="91440" tIns="45720" rIns="91440" bIns="45720">
+          <a:bodyPr wrap="square" lIns="91440" tIns="45720" rIns="91440" bIns="45720">
             <a:spAutoFit/>
           </a:bodyPr>
           <a:lstStyle/>
           <a:p>
             <a:pPr algn="ctr"/>
             <a:r>
-              <a:rPr lang="de-DE" sz="4000" b="0" cap="none" spc="0" dirty="0">
+              <a:rPr lang="de-DE" sz="3600" b="0" cap="none" spc="0" dirty="0">
                 <a:ln w="0"/>
                 <a:effectLst/>
                 <a:latin typeface="Ubuntu" panose="020B0504030602030204" pitchFamily="34" charset="0"/>
@@ -4659,6 +5455,802 @@
       </p:grpSpPr>
       <p:sp>
         <p:nvSpPr>
+          <p:cNvPr id="11" name="Rechteck 10">
+            <a:extLst>
+              <a:ext uri="{FF2B5EF4-FFF2-40B4-BE49-F238E27FC236}">
+                <a16:creationId xmlns:a16="http://schemas.microsoft.com/office/drawing/2014/main" id="{96DB0C66-F077-064A-B5FE-2A737730E099}"/>
+              </a:ext>
+            </a:extLst>
+          </p:cNvPr>
+          <p:cNvSpPr/>
+          <p:nvPr/>
+        </p:nvSpPr>
+        <p:spPr>
+          <a:xfrm>
+            <a:off x="171449" y="306741"/>
+            <a:ext cx="6515099" cy="6641968"/>
+          </a:xfrm>
+          <a:custGeom>
+            <a:avLst/>
+            <a:gdLst>
+              <a:gd name="connsiteX0" fmla="*/ 0 w 6515099"/>
+              <a:gd name="connsiteY0" fmla="*/ 0 h 6641968"/>
+              <a:gd name="connsiteX1" fmla="*/ 657433 w 6515099"/>
+              <a:gd name="connsiteY1" fmla="*/ 0 h 6641968"/>
+              <a:gd name="connsiteX2" fmla="*/ 1314865 w 6515099"/>
+              <a:gd name="connsiteY2" fmla="*/ 0 h 6641968"/>
+              <a:gd name="connsiteX3" fmla="*/ 1972298 w 6515099"/>
+              <a:gd name="connsiteY3" fmla="*/ 0 h 6641968"/>
+              <a:gd name="connsiteX4" fmla="*/ 2629731 w 6515099"/>
+              <a:gd name="connsiteY4" fmla="*/ 0 h 6641968"/>
+              <a:gd name="connsiteX5" fmla="*/ 3352315 w 6515099"/>
+              <a:gd name="connsiteY5" fmla="*/ 0 h 6641968"/>
+              <a:gd name="connsiteX6" fmla="*/ 3944596 w 6515099"/>
+              <a:gd name="connsiteY6" fmla="*/ 0 h 6641968"/>
+              <a:gd name="connsiteX7" fmla="*/ 4602029 w 6515099"/>
+              <a:gd name="connsiteY7" fmla="*/ 0 h 6641968"/>
+              <a:gd name="connsiteX8" fmla="*/ 5194311 w 6515099"/>
+              <a:gd name="connsiteY8" fmla="*/ 0 h 6641968"/>
+              <a:gd name="connsiteX9" fmla="*/ 5786592 w 6515099"/>
+              <a:gd name="connsiteY9" fmla="*/ 0 h 6641968"/>
+              <a:gd name="connsiteX10" fmla="*/ 6515099 w 6515099"/>
+              <a:gd name="connsiteY10" fmla="*/ 0 h 6641968"/>
+              <a:gd name="connsiteX11" fmla="*/ 6515099 w 6515099"/>
+              <a:gd name="connsiteY11" fmla="*/ 354238 h 6641968"/>
+              <a:gd name="connsiteX12" fmla="*/ 6515099 w 6515099"/>
+              <a:gd name="connsiteY12" fmla="*/ 974155 h 6641968"/>
+              <a:gd name="connsiteX13" fmla="*/ 6515099 w 6515099"/>
+              <a:gd name="connsiteY13" fmla="*/ 1394813 h 6641968"/>
+              <a:gd name="connsiteX14" fmla="*/ 6515099 w 6515099"/>
+              <a:gd name="connsiteY14" fmla="*/ 2014730 h 6641968"/>
+              <a:gd name="connsiteX15" fmla="*/ 6515099 w 6515099"/>
+              <a:gd name="connsiteY15" fmla="*/ 2501808 h 6641968"/>
+              <a:gd name="connsiteX16" fmla="*/ 6515099 w 6515099"/>
+              <a:gd name="connsiteY16" fmla="*/ 2922466 h 6641968"/>
+              <a:gd name="connsiteX17" fmla="*/ 6515099 w 6515099"/>
+              <a:gd name="connsiteY17" fmla="*/ 3276704 h 6641968"/>
+              <a:gd name="connsiteX18" fmla="*/ 6515099 w 6515099"/>
+              <a:gd name="connsiteY18" fmla="*/ 3697362 h 6641968"/>
+              <a:gd name="connsiteX19" fmla="*/ 6515099 w 6515099"/>
+              <a:gd name="connsiteY19" fmla="*/ 4118020 h 6641968"/>
+              <a:gd name="connsiteX20" fmla="*/ 6515099 w 6515099"/>
+              <a:gd name="connsiteY20" fmla="*/ 4671517 h 6641968"/>
+              <a:gd name="connsiteX21" fmla="*/ 6515099 w 6515099"/>
+              <a:gd name="connsiteY21" fmla="*/ 5225015 h 6641968"/>
+              <a:gd name="connsiteX22" fmla="*/ 6515099 w 6515099"/>
+              <a:gd name="connsiteY22" fmla="*/ 5712092 h 6641968"/>
+              <a:gd name="connsiteX23" fmla="*/ 6515099 w 6515099"/>
+              <a:gd name="connsiteY23" fmla="*/ 6641968 h 6641968"/>
+              <a:gd name="connsiteX24" fmla="*/ 6053119 w 6515099"/>
+              <a:gd name="connsiteY24" fmla="*/ 6641968 h 6641968"/>
+              <a:gd name="connsiteX25" fmla="*/ 5460838 w 6515099"/>
+              <a:gd name="connsiteY25" fmla="*/ 6641968 h 6641968"/>
+              <a:gd name="connsiteX26" fmla="*/ 4803405 w 6515099"/>
+              <a:gd name="connsiteY26" fmla="*/ 6641968 h 6641968"/>
+              <a:gd name="connsiteX27" fmla="*/ 4406576 w 6515099"/>
+              <a:gd name="connsiteY27" fmla="*/ 6641968 h 6641968"/>
+              <a:gd name="connsiteX28" fmla="*/ 3683992 w 6515099"/>
+              <a:gd name="connsiteY28" fmla="*/ 6641968 h 6641968"/>
+              <a:gd name="connsiteX29" fmla="*/ 3156862 w 6515099"/>
+              <a:gd name="connsiteY29" fmla="*/ 6641968 h 6641968"/>
+              <a:gd name="connsiteX30" fmla="*/ 2499429 w 6515099"/>
+              <a:gd name="connsiteY30" fmla="*/ 6641968 h 6641968"/>
+              <a:gd name="connsiteX31" fmla="*/ 2102600 w 6515099"/>
+              <a:gd name="connsiteY31" fmla="*/ 6641968 h 6641968"/>
+              <a:gd name="connsiteX32" fmla="*/ 1380016 w 6515099"/>
+              <a:gd name="connsiteY32" fmla="*/ 6641968 h 6641968"/>
+              <a:gd name="connsiteX33" fmla="*/ 852886 w 6515099"/>
+              <a:gd name="connsiteY33" fmla="*/ 6641968 h 6641968"/>
+              <a:gd name="connsiteX34" fmla="*/ 0 w 6515099"/>
+              <a:gd name="connsiteY34" fmla="*/ 6641968 h 6641968"/>
+              <a:gd name="connsiteX35" fmla="*/ 0 w 6515099"/>
+              <a:gd name="connsiteY35" fmla="*/ 6221310 h 6641968"/>
+              <a:gd name="connsiteX36" fmla="*/ 0 w 6515099"/>
+              <a:gd name="connsiteY36" fmla="*/ 5534973 h 6641968"/>
+              <a:gd name="connsiteX37" fmla="*/ 0 w 6515099"/>
+              <a:gd name="connsiteY37" fmla="*/ 5180735 h 6641968"/>
+              <a:gd name="connsiteX38" fmla="*/ 0 w 6515099"/>
+              <a:gd name="connsiteY38" fmla="*/ 4627238 h 6641968"/>
+              <a:gd name="connsiteX39" fmla="*/ 0 w 6515099"/>
+              <a:gd name="connsiteY39" fmla="*/ 4272999 h 6641968"/>
+              <a:gd name="connsiteX40" fmla="*/ 0 w 6515099"/>
+              <a:gd name="connsiteY40" fmla="*/ 3653082 h 6641968"/>
+              <a:gd name="connsiteX41" fmla="*/ 0 w 6515099"/>
+              <a:gd name="connsiteY41" fmla="*/ 3099585 h 6641968"/>
+              <a:gd name="connsiteX42" fmla="*/ 0 w 6515099"/>
+              <a:gd name="connsiteY42" fmla="*/ 2479668 h 6641968"/>
+              <a:gd name="connsiteX43" fmla="*/ 0 w 6515099"/>
+              <a:gd name="connsiteY43" fmla="*/ 1926171 h 6641968"/>
+              <a:gd name="connsiteX44" fmla="*/ 0 w 6515099"/>
+              <a:gd name="connsiteY44" fmla="*/ 1306254 h 6641968"/>
+              <a:gd name="connsiteX45" fmla="*/ 0 w 6515099"/>
+              <a:gd name="connsiteY45" fmla="*/ 686337 h 6641968"/>
+              <a:gd name="connsiteX46" fmla="*/ 0 w 6515099"/>
+              <a:gd name="connsiteY46" fmla="*/ 0 h 6641968"/>
+            </a:gdLst>
+            <a:ahLst/>
+            <a:cxnLst>
+              <a:cxn ang="0">
+                <a:pos x="connsiteX0" y="connsiteY0"/>
+              </a:cxn>
+              <a:cxn ang="0">
+                <a:pos x="connsiteX1" y="connsiteY1"/>
+              </a:cxn>
+              <a:cxn ang="0">
+                <a:pos x="connsiteX2" y="connsiteY2"/>
+              </a:cxn>
+              <a:cxn ang="0">
+                <a:pos x="connsiteX3" y="connsiteY3"/>
+              </a:cxn>
+              <a:cxn ang="0">
+                <a:pos x="connsiteX4" y="connsiteY4"/>
+              </a:cxn>
+              <a:cxn ang="0">
+                <a:pos x="connsiteX5" y="connsiteY5"/>
+              </a:cxn>
+              <a:cxn ang="0">
+                <a:pos x="connsiteX6" y="connsiteY6"/>
+              </a:cxn>
+              <a:cxn ang="0">
+                <a:pos x="connsiteX7" y="connsiteY7"/>
+              </a:cxn>
+              <a:cxn ang="0">
+                <a:pos x="connsiteX8" y="connsiteY8"/>
+              </a:cxn>
+              <a:cxn ang="0">
+                <a:pos x="connsiteX9" y="connsiteY9"/>
+              </a:cxn>
+              <a:cxn ang="0">
+                <a:pos x="connsiteX10" y="connsiteY10"/>
+              </a:cxn>
+              <a:cxn ang="0">
+                <a:pos x="connsiteX11" y="connsiteY11"/>
+              </a:cxn>
+              <a:cxn ang="0">
+                <a:pos x="connsiteX12" y="connsiteY12"/>
+              </a:cxn>
+              <a:cxn ang="0">
+                <a:pos x="connsiteX13" y="connsiteY13"/>
+              </a:cxn>
+              <a:cxn ang="0">
+                <a:pos x="connsiteX14" y="connsiteY14"/>
+              </a:cxn>
+              <a:cxn ang="0">
+                <a:pos x="connsiteX15" y="connsiteY15"/>
+              </a:cxn>
+              <a:cxn ang="0">
+                <a:pos x="connsiteX16" y="connsiteY16"/>
+              </a:cxn>
+              <a:cxn ang="0">
+                <a:pos x="connsiteX17" y="connsiteY17"/>
+              </a:cxn>
+              <a:cxn ang="0">
+                <a:pos x="connsiteX18" y="connsiteY18"/>
+              </a:cxn>
+              <a:cxn ang="0">
+                <a:pos x="connsiteX19" y="connsiteY19"/>
+              </a:cxn>
+              <a:cxn ang="0">
+                <a:pos x="connsiteX20" y="connsiteY20"/>
+              </a:cxn>
+              <a:cxn ang="0">
+                <a:pos x="connsiteX21" y="connsiteY21"/>
+              </a:cxn>
+              <a:cxn ang="0">
+                <a:pos x="connsiteX22" y="connsiteY22"/>
+              </a:cxn>
+              <a:cxn ang="0">
+                <a:pos x="connsiteX23" y="connsiteY23"/>
+              </a:cxn>
+              <a:cxn ang="0">
+                <a:pos x="connsiteX24" y="connsiteY24"/>
+              </a:cxn>
+              <a:cxn ang="0">
+                <a:pos x="connsiteX25" y="connsiteY25"/>
+              </a:cxn>
+              <a:cxn ang="0">
+                <a:pos x="connsiteX26" y="connsiteY26"/>
+              </a:cxn>
+              <a:cxn ang="0">
+                <a:pos x="connsiteX27" y="connsiteY27"/>
+              </a:cxn>
+              <a:cxn ang="0">
+                <a:pos x="connsiteX28" y="connsiteY28"/>
+              </a:cxn>
+              <a:cxn ang="0">
+                <a:pos x="connsiteX29" y="connsiteY29"/>
+              </a:cxn>
+              <a:cxn ang="0">
+                <a:pos x="connsiteX30" y="connsiteY30"/>
+              </a:cxn>
+              <a:cxn ang="0">
+                <a:pos x="connsiteX31" y="connsiteY31"/>
+              </a:cxn>
+              <a:cxn ang="0">
+                <a:pos x="connsiteX32" y="connsiteY32"/>
+              </a:cxn>
+              <a:cxn ang="0">
+                <a:pos x="connsiteX33" y="connsiteY33"/>
+              </a:cxn>
+              <a:cxn ang="0">
+                <a:pos x="connsiteX34" y="connsiteY34"/>
+              </a:cxn>
+              <a:cxn ang="0">
+                <a:pos x="connsiteX35" y="connsiteY35"/>
+              </a:cxn>
+              <a:cxn ang="0">
+                <a:pos x="connsiteX36" y="connsiteY36"/>
+              </a:cxn>
+              <a:cxn ang="0">
+                <a:pos x="connsiteX37" y="connsiteY37"/>
+              </a:cxn>
+              <a:cxn ang="0">
+                <a:pos x="connsiteX38" y="connsiteY38"/>
+              </a:cxn>
+              <a:cxn ang="0">
+                <a:pos x="connsiteX39" y="connsiteY39"/>
+              </a:cxn>
+              <a:cxn ang="0">
+                <a:pos x="connsiteX40" y="connsiteY40"/>
+              </a:cxn>
+              <a:cxn ang="0">
+                <a:pos x="connsiteX41" y="connsiteY41"/>
+              </a:cxn>
+              <a:cxn ang="0">
+                <a:pos x="connsiteX42" y="connsiteY42"/>
+              </a:cxn>
+              <a:cxn ang="0">
+                <a:pos x="connsiteX43" y="connsiteY43"/>
+              </a:cxn>
+              <a:cxn ang="0">
+                <a:pos x="connsiteX44" y="connsiteY44"/>
+              </a:cxn>
+              <a:cxn ang="0">
+                <a:pos x="connsiteX45" y="connsiteY45"/>
+              </a:cxn>
+              <a:cxn ang="0">
+                <a:pos x="connsiteX46" y="connsiteY46"/>
+              </a:cxn>
+            </a:cxnLst>
+            <a:rect l="l" t="t" r="r" b="b"/>
+            <a:pathLst>
+              <a:path w="6515099" h="6641968" fill="none" extrusionOk="0">
+                <a:moveTo>
+                  <a:pt x="0" y="0"/>
+                </a:moveTo>
+                <a:cubicBezTo>
+                  <a:pt x="267914" y="-63324"/>
+                  <a:pt x="487773" y="3502"/>
+                  <a:pt x="657433" y="0"/>
+                </a:cubicBezTo>
+                <a:cubicBezTo>
+                  <a:pt x="827093" y="-3502"/>
+                  <a:pt x="1022992" y="32449"/>
+                  <a:pt x="1314865" y="0"/>
+                </a:cubicBezTo>
+                <a:cubicBezTo>
+                  <a:pt x="1606738" y="-32449"/>
+                  <a:pt x="1656926" y="24363"/>
+                  <a:pt x="1972298" y="0"/>
+                </a:cubicBezTo>
+                <a:cubicBezTo>
+                  <a:pt x="2287670" y="-24363"/>
+                  <a:pt x="2497268" y="18267"/>
+                  <a:pt x="2629731" y="0"/>
+                </a:cubicBezTo>
+                <a:cubicBezTo>
+                  <a:pt x="2762194" y="-18267"/>
+                  <a:pt x="3159100" y="63595"/>
+                  <a:pt x="3352315" y="0"/>
+                </a:cubicBezTo>
+                <a:cubicBezTo>
+                  <a:pt x="3545530" y="-63595"/>
+                  <a:pt x="3661914" y="23504"/>
+                  <a:pt x="3944596" y="0"/>
+                </a:cubicBezTo>
+                <a:cubicBezTo>
+                  <a:pt x="4227278" y="-23504"/>
+                  <a:pt x="4319578" y="5427"/>
+                  <a:pt x="4602029" y="0"/>
+                </a:cubicBezTo>
+                <a:cubicBezTo>
+                  <a:pt x="4884480" y="-5427"/>
+                  <a:pt x="5056803" y="66242"/>
+                  <a:pt x="5194311" y="0"/>
+                </a:cubicBezTo>
+                <a:cubicBezTo>
+                  <a:pt x="5331819" y="-66242"/>
+                  <a:pt x="5585193" y="65641"/>
+                  <a:pt x="5786592" y="0"/>
+                </a:cubicBezTo>
+                <a:cubicBezTo>
+                  <a:pt x="5987991" y="-65641"/>
+                  <a:pt x="6196699" y="22746"/>
+                  <a:pt x="6515099" y="0"/>
+                </a:cubicBezTo>
+                <a:cubicBezTo>
+                  <a:pt x="6516202" y="110074"/>
+                  <a:pt x="6497663" y="193438"/>
+                  <a:pt x="6515099" y="354238"/>
+                </a:cubicBezTo>
+                <a:cubicBezTo>
+                  <a:pt x="6532535" y="515038"/>
+                  <a:pt x="6452376" y="753650"/>
+                  <a:pt x="6515099" y="974155"/>
+                </a:cubicBezTo>
+                <a:cubicBezTo>
+                  <a:pt x="6577822" y="1194660"/>
+                  <a:pt x="6477211" y="1267390"/>
+                  <a:pt x="6515099" y="1394813"/>
+                </a:cubicBezTo>
+                <a:cubicBezTo>
+                  <a:pt x="6552987" y="1522236"/>
+                  <a:pt x="6452743" y="1833207"/>
+                  <a:pt x="6515099" y="2014730"/>
+                </a:cubicBezTo>
+                <a:cubicBezTo>
+                  <a:pt x="6577455" y="2196253"/>
+                  <a:pt x="6493850" y="2261830"/>
+                  <a:pt x="6515099" y="2501808"/>
+                </a:cubicBezTo>
+                <a:cubicBezTo>
+                  <a:pt x="6536348" y="2741786"/>
+                  <a:pt x="6514425" y="2737123"/>
+                  <a:pt x="6515099" y="2922466"/>
+                </a:cubicBezTo>
+                <a:cubicBezTo>
+                  <a:pt x="6515773" y="3107809"/>
+                  <a:pt x="6507903" y="3204881"/>
+                  <a:pt x="6515099" y="3276704"/>
+                </a:cubicBezTo>
+                <a:cubicBezTo>
+                  <a:pt x="6522295" y="3348527"/>
+                  <a:pt x="6472245" y="3551716"/>
+                  <a:pt x="6515099" y="3697362"/>
+                </a:cubicBezTo>
+                <a:cubicBezTo>
+                  <a:pt x="6557953" y="3843008"/>
+                  <a:pt x="6505471" y="3965311"/>
+                  <a:pt x="6515099" y="4118020"/>
+                </a:cubicBezTo>
+                <a:cubicBezTo>
+                  <a:pt x="6524727" y="4270729"/>
+                  <a:pt x="6510802" y="4558781"/>
+                  <a:pt x="6515099" y="4671517"/>
+                </a:cubicBezTo>
+                <a:cubicBezTo>
+                  <a:pt x="6519396" y="4784253"/>
+                  <a:pt x="6467830" y="4974059"/>
+                  <a:pt x="6515099" y="5225015"/>
+                </a:cubicBezTo>
+                <a:cubicBezTo>
+                  <a:pt x="6562368" y="5475971"/>
+                  <a:pt x="6471076" y="5571260"/>
+                  <a:pt x="6515099" y="5712092"/>
+                </a:cubicBezTo>
+                <a:cubicBezTo>
+                  <a:pt x="6559122" y="5852924"/>
+                  <a:pt x="6414072" y="6187388"/>
+                  <a:pt x="6515099" y="6641968"/>
+                </a:cubicBezTo>
+                <a:cubicBezTo>
+                  <a:pt x="6350386" y="6686068"/>
+                  <a:pt x="6160392" y="6609874"/>
+                  <a:pt x="6053119" y="6641968"/>
+                </a:cubicBezTo>
+                <a:cubicBezTo>
+                  <a:pt x="5945846" y="6674062"/>
+                  <a:pt x="5583799" y="6639808"/>
+                  <a:pt x="5460838" y="6641968"/>
+                </a:cubicBezTo>
+                <a:cubicBezTo>
+                  <a:pt x="5337877" y="6644128"/>
+                  <a:pt x="5014489" y="6566095"/>
+                  <a:pt x="4803405" y="6641968"/>
+                </a:cubicBezTo>
+                <a:cubicBezTo>
+                  <a:pt x="4592321" y="6717841"/>
+                  <a:pt x="4535479" y="6611402"/>
+                  <a:pt x="4406576" y="6641968"/>
+                </a:cubicBezTo>
+                <a:cubicBezTo>
+                  <a:pt x="4277673" y="6672534"/>
+                  <a:pt x="3860486" y="6621533"/>
+                  <a:pt x="3683992" y="6641968"/>
+                </a:cubicBezTo>
+                <a:cubicBezTo>
+                  <a:pt x="3507498" y="6662403"/>
+                  <a:pt x="3355642" y="6586304"/>
+                  <a:pt x="3156862" y="6641968"/>
+                </a:cubicBezTo>
+                <a:cubicBezTo>
+                  <a:pt x="2958082" y="6697632"/>
+                  <a:pt x="2739083" y="6586962"/>
+                  <a:pt x="2499429" y="6641968"/>
+                </a:cubicBezTo>
+                <a:cubicBezTo>
+                  <a:pt x="2259775" y="6696974"/>
+                  <a:pt x="2236643" y="6594848"/>
+                  <a:pt x="2102600" y="6641968"/>
+                </a:cubicBezTo>
+                <a:cubicBezTo>
+                  <a:pt x="1968557" y="6689088"/>
+                  <a:pt x="1681287" y="6582013"/>
+                  <a:pt x="1380016" y="6641968"/>
+                </a:cubicBezTo>
+                <a:cubicBezTo>
+                  <a:pt x="1078745" y="6701923"/>
+                  <a:pt x="1098389" y="6585281"/>
+                  <a:pt x="852886" y="6641968"/>
+                </a:cubicBezTo>
+                <a:cubicBezTo>
+                  <a:pt x="607383" y="6698655"/>
+                  <a:pt x="186353" y="6553018"/>
+                  <a:pt x="0" y="6641968"/>
+                </a:cubicBezTo>
+                <a:cubicBezTo>
+                  <a:pt x="-43194" y="6519308"/>
+                  <a:pt x="40699" y="6364607"/>
+                  <a:pt x="0" y="6221310"/>
+                </a:cubicBezTo>
+                <a:cubicBezTo>
+                  <a:pt x="-40699" y="6078013"/>
+                  <a:pt x="27231" y="5718516"/>
+                  <a:pt x="0" y="5534973"/>
+                </a:cubicBezTo>
+                <a:cubicBezTo>
+                  <a:pt x="-27231" y="5351430"/>
+                  <a:pt x="40585" y="5329103"/>
+                  <a:pt x="0" y="5180735"/>
+                </a:cubicBezTo>
+                <a:cubicBezTo>
+                  <a:pt x="-40585" y="5032367"/>
+                  <a:pt x="39022" y="4841838"/>
+                  <a:pt x="0" y="4627238"/>
+                </a:cubicBezTo>
+                <a:cubicBezTo>
+                  <a:pt x="-39022" y="4412638"/>
+                  <a:pt x="32952" y="4439907"/>
+                  <a:pt x="0" y="4272999"/>
+                </a:cubicBezTo>
+                <a:cubicBezTo>
+                  <a:pt x="-32952" y="4106091"/>
+                  <a:pt x="958" y="3924331"/>
+                  <a:pt x="0" y="3653082"/>
+                </a:cubicBezTo>
+                <a:cubicBezTo>
+                  <a:pt x="-958" y="3381833"/>
+                  <a:pt x="47533" y="3233929"/>
+                  <a:pt x="0" y="3099585"/>
+                </a:cubicBezTo>
+                <a:cubicBezTo>
+                  <a:pt x="-47533" y="2965241"/>
+                  <a:pt x="41849" y="2727950"/>
+                  <a:pt x="0" y="2479668"/>
+                </a:cubicBezTo>
+                <a:cubicBezTo>
+                  <a:pt x="-41849" y="2231386"/>
+                  <a:pt x="46600" y="2161671"/>
+                  <a:pt x="0" y="1926171"/>
+                </a:cubicBezTo>
+                <a:cubicBezTo>
+                  <a:pt x="-46600" y="1690671"/>
+                  <a:pt x="33223" y="1435152"/>
+                  <a:pt x="0" y="1306254"/>
+                </a:cubicBezTo>
+                <a:cubicBezTo>
+                  <a:pt x="-33223" y="1177356"/>
+                  <a:pt x="50523" y="884107"/>
+                  <a:pt x="0" y="686337"/>
+                </a:cubicBezTo>
+                <a:cubicBezTo>
+                  <a:pt x="-50523" y="488567"/>
+                  <a:pt x="6294" y="189306"/>
+                  <a:pt x="0" y="0"/>
+                </a:cubicBezTo>
+                <a:close/>
+              </a:path>
+              <a:path w="6515099" h="6641968" stroke="0" extrusionOk="0">
+                <a:moveTo>
+                  <a:pt x="0" y="0"/>
+                </a:moveTo>
+                <a:cubicBezTo>
+                  <a:pt x="127104" y="-49547"/>
+                  <a:pt x="359888" y="12352"/>
+                  <a:pt x="527131" y="0"/>
+                </a:cubicBezTo>
+                <a:cubicBezTo>
+                  <a:pt x="694374" y="-12352"/>
+                  <a:pt x="826920" y="45986"/>
+                  <a:pt x="923959" y="0"/>
+                </a:cubicBezTo>
+                <a:cubicBezTo>
+                  <a:pt x="1020998" y="-45986"/>
+                  <a:pt x="1343903" y="659"/>
+                  <a:pt x="1646543" y="0"/>
+                </a:cubicBezTo>
+                <a:cubicBezTo>
+                  <a:pt x="1949183" y="-659"/>
+                  <a:pt x="1995466" y="62852"/>
+                  <a:pt x="2173674" y="0"/>
+                </a:cubicBezTo>
+                <a:cubicBezTo>
+                  <a:pt x="2351882" y="-62852"/>
+                  <a:pt x="2544702" y="55348"/>
+                  <a:pt x="2700805" y="0"/>
+                </a:cubicBezTo>
+                <a:cubicBezTo>
+                  <a:pt x="2856908" y="-55348"/>
+                  <a:pt x="3083864" y="53521"/>
+                  <a:pt x="3423388" y="0"/>
+                </a:cubicBezTo>
+                <a:cubicBezTo>
+                  <a:pt x="3762912" y="-53521"/>
+                  <a:pt x="3766469" y="53681"/>
+                  <a:pt x="3885368" y="0"/>
+                </a:cubicBezTo>
+                <a:cubicBezTo>
+                  <a:pt x="4004267" y="-53681"/>
+                  <a:pt x="4273414" y="79607"/>
+                  <a:pt x="4607952" y="0"/>
+                </a:cubicBezTo>
+                <a:cubicBezTo>
+                  <a:pt x="4942490" y="-79607"/>
+                  <a:pt x="5116807" y="6003"/>
+                  <a:pt x="5330536" y="0"/>
+                </a:cubicBezTo>
+                <a:cubicBezTo>
+                  <a:pt x="5544265" y="-6003"/>
+                  <a:pt x="5688449" y="53147"/>
+                  <a:pt x="5922817" y="0"/>
+                </a:cubicBezTo>
+                <a:cubicBezTo>
+                  <a:pt x="6157185" y="-53147"/>
+                  <a:pt x="6319099" y="31111"/>
+                  <a:pt x="6515099" y="0"/>
+                </a:cubicBezTo>
+                <a:cubicBezTo>
+                  <a:pt x="6519773" y="150916"/>
+                  <a:pt x="6480977" y="292189"/>
+                  <a:pt x="6515099" y="487078"/>
+                </a:cubicBezTo>
+                <a:cubicBezTo>
+                  <a:pt x="6549221" y="681967"/>
+                  <a:pt x="6488972" y="730886"/>
+                  <a:pt x="6515099" y="841316"/>
+                </a:cubicBezTo>
+                <a:cubicBezTo>
+                  <a:pt x="6541226" y="951746"/>
+                  <a:pt x="6487964" y="1256245"/>
+                  <a:pt x="6515099" y="1394813"/>
+                </a:cubicBezTo>
+                <a:cubicBezTo>
+                  <a:pt x="6542234" y="1533381"/>
+                  <a:pt x="6495631" y="1773737"/>
+                  <a:pt x="6515099" y="1948311"/>
+                </a:cubicBezTo>
+                <a:cubicBezTo>
+                  <a:pt x="6534567" y="2122885"/>
+                  <a:pt x="6508519" y="2366040"/>
+                  <a:pt x="6515099" y="2501808"/>
+                </a:cubicBezTo>
+                <a:cubicBezTo>
+                  <a:pt x="6521679" y="2637576"/>
+                  <a:pt x="6479699" y="2969107"/>
+                  <a:pt x="6515099" y="3121725"/>
+                </a:cubicBezTo>
+                <a:cubicBezTo>
+                  <a:pt x="6550499" y="3274343"/>
+                  <a:pt x="6500683" y="3556862"/>
+                  <a:pt x="6515099" y="3741642"/>
+                </a:cubicBezTo>
+                <a:cubicBezTo>
+                  <a:pt x="6529515" y="3926422"/>
+                  <a:pt x="6451347" y="4087464"/>
+                  <a:pt x="6515099" y="4361559"/>
+                </a:cubicBezTo>
+                <a:cubicBezTo>
+                  <a:pt x="6578851" y="4635654"/>
+                  <a:pt x="6497708" y="4568806"/>
+                  <a:pt x="6515099" y="4715797"/>
+                </a:cubicBezTo>
+                <a:cubicBezTo>
+                  <a:pt x="6532490" y="4862788"/>
+                  <a:pt x="6467477" y="5037027"/>
+                  <a:pt x="6515099" y="5136455"/>
+                </a:cubicBezTo>
+                <a:cubicBezTo>
+                  <a:pt x="6562721" y="5235883"/>
+                  <a:pt x="6492134" y="5611798"/>
+                  <a:pt x="6515099" y="5756372"/>
+                </a:cubicBezTo>
+                <a:cubicBezTo>
+                  <a:pt x="6538064" y="5900946"/>
+                  <a:pt x="6430305" y="6316949"/>
+                  <a:pt x="6515099" y="6641968"/>
+                </a:cubicBezTo>
+                <a:cubicBezTo>
+                  <a:pt x="6284160" y="6679776"/>
+                  <a:pt x="6219405" y="6602940"/>
+                  <a:pt x="6053119" y="6641968"/>
+                </a:cubicBezTo>
+                <a:cubicBezTo>
+                  <a:pt x="5886833" y="6680996"/>
+                  <a:pt x="5839742" y="6625267"/>
+                  <a:pt x="5656290" y="6641968"/>
+                </a:cubicBezTo>
+                <a:cubicBezTo>
+                  <a:pt x="5472838" y="6658669"/>
+                  <a:pt x="5452807" y="6635635"/>
+                  <a:pt x="5259462" y="6641968"/>
+                </a:cubicBezTo>
+                <a:cubicBezTo>
+                  <a:pt x="5066117" y="6648301"/>
+                  <a:pt x="4827788" y="6630801"/>
+                  <a:pt x="4667180" y="6641968"/>
+                </a:cubicBezTo>
+                <a:cubicBezTo>
+                  <a:pt x="4506572" y="6653135"/>
+                  <a:pt x="4418911" y="6597049"/>
+                  <a:pt x="4205200" y="6641968"/>
+                </a:cubicBezTo>
+                <a:cubicBezTo>
+                  <a:pt x="3991489" y="6686887"/>
+                  <a:pt x="3726578" y="6609635"/>
+                  <a:pt x="3547768" y="6641968"/>
+                </a:cubicBezTo>
+                <a:cubicBezTo>
+                  <a:pt x="3368958" y="6674301"/>
+                  <a:pt x="3230992" y="6606183"/>
+                  <a:pt x="3085788" y="6641968"/>
+                </a:cubicBezTo>
+                <a:cubicBezTo>
+                  <a:pt x="2940584" y="6677753"/>
+                  <a:pt x="2600771" y="6585999"/>
+                  <a:pt x="2428355" y="6641968"/>
+                </a:cubicBezTo>
+                <a:cubicBezTo>
+                  <a:pt x="2255939" y="6697937"/>
+                  <a:pt x="2137600" y="6624584"/>
+                  <a:pt x="2031526" y="6641968"/>
+                </a:cubicBezTo>
+                <a:cubicBezTo>
+                  <a:pt x="1925452" y="6659352"/>
+                  <a:pt x="1558054" y="6620828"/>
+                  <a:pt x="1374094" y="6641968"/>
+                </a:cubicBezTo>
+                <a:cubicBezTo>
+                  <a:pt x="1190134" y="6663108"/>
+                  <a:pt x="1009180" y="6606827"/>
+                  <a:pt x="912114" y="6641968"/>
+                </a:cubicBezTo>
+                <a:cubicBezTo>
+                  <a:pt x="815048" y="6677109"/>
+                  <a:pt x="675705" y="6598588"/>
+                  <a:pt x="515285" y="6641968"/>
+                </a:cubicBezTo>
+                <a:cubicBezTo>
+                  <a:pt x="354865" y="6685348"/>
+                  <a:pt x="251106" y="6618322"/>
+                  <a:pt x="0" y="6641968"/>
+                </a:cubicBezTo>
+                <a:cubicBezTo>
+                  <a:pt x="-8995" y="6486240"/>
+                  <a:pt x="45167" y="6310113"/>
+                  <a:pt x="0" y="6022051"/>
+                </a:cubicBezTo>
+                <a:cubicBezTo>
+                  <a:pt x="-45167" y="5733989"/>
+                  <a:pt x="42907" y="5760095"/>
+                  <a:pt x="0" y="5601393"/>
+                </a:cubicBezTo>
+                <a:cubicBezTo>
+                  <a:pt x="-42907" y="5442691"/>
+                  <a:pt x="8053" y="5373999"/>
+                  <a:pt x="0" y="5247155"/>
+                </a:cubicBezTo>
+                <a:cubicBezTo>
+                  <a:pt x="-8053" y="5120311"/>
+                  <a:pt x="6025" y="5024608"/>
+                  <a:pt x="0" y="4892916"/>
+                </a:cubicBezTo>
+                <a:cubicBezTo>
+                  <a:pt x="-6025" y="4761224"/>
+                  <a:pt x="43206" y="4465747"/>
+                  <a:pt x="0" y="4272999"/>
+                </a:cubicBezTo>
+                <a:cubicBezTo>
+                  <a:pt x="-43206" y="4080251"/>
+                  <a:pt x="1926" y="4077643"/>
+                  <a:pt x="0" y="3918761"/>
+                </a:cubicBezTo>
+                <a:cubicBezTo>
+                  <a:pt x="-1926" y="3759879"/>
+                  <a:pt x="20670" y="3481603"/>
+                  <a:pt x="0" y="3365264"/>
+                </a:cubicBezTo>
+                <a:cubicBezTo>
+                  <a:pt x="-20670" y="3248925"/>
+                  <a:pt x="7244" y="3059394"/>
+                  <a:pt x="0" y="2944606"/>
+                </a:cubicBezTo>
+                <a:cubicBezTo>
+                  <a:pt x="-7244" y="2829818"/>
+                  <a:pt x="35688" y="2603455"/>
+                  <a:pt x="0" y="2391108"/>
+                </a:cubicBezTo>
+                <a:cubicBezTo>
+                  <a:pt x="-35688" y="2178761"/>
+                  <a:pt x="3065" y="2066602"/>
+                  <a:pt x="0" y="1837611"/>
+                </a:cubicBezTo>
+                <a:cubicBezTo>
+                  <a:pt x="-3065" y="1608620"/>
+                  <a:pt x="12641" y="1463625"/>
+                  <a:pt x="0" y="1284114"/>
+                </a:cubicBezTo>
+                <a:cubicBezTo>
+                  <a:pt x="-12641" y="1104603"/>
+                  <a:pt x="5300" y="889697"/>
+                  <a:pt x="0" y="730616"/>
+                </a:cubicBezTo>
+                <a:cubicBezTo>
+                  <a:pt x="-5300" y="571535"/>
+                  <a:pt x="24127" y="222612"/>
+                  <a:pt x="0" y="0"/>
+                </a:cubicBezTo>
+                <a:close/>
+              </a:path>
+            </a:pathLst>
+          </a:custGeom>
+          <a:solidFill>
+            <a:schemeClr val="bg1"/>
+          </a:solidFill>
+          <a:ln w="38100">
+            <a:solidFill>
+              <a:schemeClr val="tx1"/>
+            </a:solidFill>
+            <a:extLst>
+              <a:ext uri="{C807C97D-BFC1-408E-A445-0C87EB9F89A2}">
+                <ask:lineSketchStyleProps xmlns:ask="http://schemas.microsoft.com/office/drawing/2018/sketchyshapes" sd="1219033472">
+                  <a:prstGeom prst="rect">
+                    <a:avLst/>
+                  </a:prstGeom>
+                  <ask:type>
+                    <ask:lineSketchScribble/>
+                  </ask:type>
+                </ask:lineSketchStyleProps>
+              </a:ext>
+            </a:extLst>
+          </a:ln>
+        </p:spPr>
+        <p:style>
+          <a:lnRef idx="2">
+            <a:schemeClr val="accent1">
+              <a:shade val="50000"/>
+            </a:schemeClr>
+          </a:lnRef>
+          <a:fillRef idx="1">
+            <a:schemeClr val="accent1"/>
+          </a:fillRef>
+          <a:effectRef idx="0">
+            <a:schemeClr val="accent1"/>
+          </a:effectRef>
+          <a:fontRef idx="minor">
+            <a:schemeClr val="lt1"/>
+          </a:fontRef>
+        </p:style>
+        <p:txBody>
+          <a:bodyPr rtlCol="0" anchor="ctr"/>
+          <a:lstStyle/>
+          <a:p>
+            <a:pPr algn="ctr"/>
+            <a:endParaRPr lang="de-DE" dirty="0"/>
+          </a:p>
+        </p:txBody>
+      </p:sp>
+      <p:sp>
+        <p:nvSpPr>
           <p:cNvPr id="10" name="Abgerundetes Rechteck 9">
             <a:extLst>
               <a:ext uri="{FF2B5EF4-FFF2-40B4-BE49-F238E27FC236}">
@@ -4923,7 +6515,7 @@
               <a:rPr lang="de-DE" sz="1600" b="1" dirty="0">
                 <a:latin typeface="Ubuntu" panose="020B0504030602030204" pitchFamily="34" charset="0"/>
               </a:rPr>
-              <a:t>Buttler</a:t>
+              <a:t>Butler</a:t>
             </a:r>
             <a:r>
               <a:rPr lang="de-DE" sz="1600" dirty="0">
@@ -4971,7 +6563,7 @@
               <a:rPr lang="de-DE" sz="1600" dirty="0">
                 <a:latin typeface="Ubuntu" panose="020B0504030602030204" pitchFamily="34" charset="0"/>
               </a:rPr>
-              <a:t>setzen..</a:t>
+              <a:t>setzen</a:t>
             </a:r>
           </a:p>
           <a:p>
@@ -5159,6 +6751,802 @@
       </p:grpSpPr>
       <p:sp>
         <p:nvSpPr>
+          <p:cNvPr id="14" name="Rechteck 13">
+            <a:extLst>
+              <a:ext uri="{FF2B5EF4-FFF2-40B4-BE49-F238E27FC236}">
+                <a16:creationId xmlns:a16="http://schemas.microsoft.com/office/drawing/2014/main" id="{8D36A638-FFE3-A74C-998F-CA7F654036E5}"/>
+              </a:ext>
+            </a:extLst>
+          </p:cNvPr>
+          <p:cNvSpPr/>
+          <p:nvPr/>
+        </p:nvSpPr>
+        <p:spPr>
+          <a:xfrm>
+            <a:off x="171449" y="306741"/>
+            <a:ext cx="6515099" cy="6641968"/>
+          </a:xfrm>
+          <a:custGeom>
+            <a:avLst/>
+            <a:gdLst>
+              <a:gd name="connsiteX0" fmla="*/ 0 w 6515099"/>
+              <a:gd name="connsiteY0" fmla="*/ 0 h 6641968"/>
+              <a:gd name="connsiteX1" fmla="*/ 657433 w 6515099"/>
+              <a:gd name="connsiteY1" fmla="*/ 0 h 6641968"/>
+              <a:gd name="connsiteX2" fmla="*/ 1314865 w 6515099"/>
+              <a:gd name="connsiteY2" fmla="*/ 0 h 6641968"/>
+              <a:gd name="connsiteX3" fmla="*/ 1972298 w 6515099"/>
+              <a:gd name="connsiteY3" fmla="*/ 0 h 6641968"/>
+              <a:gd name="connsiteX4" fmla="*/ 2629731 w 6515099"/>
+              <a:gd name="connsiteY4" fmla="*/ 0 h 6641968"/>
+              <a:gd name="connsiteX5" fmla="*/ 3352315 w 6515099"/>
+              <a:gd name="connsiteY5" fmla="*/ 0 h 6641968"/>
+              <a:gd name="connsiteX6" fmla="*/ 3944596 w 6515099"/>
+              <a:gd name="connsiteY6" fmla="*/ 0 h 6641968"/>
+              <a:gd name="connsiteX7" fmla="*/ 4602029 w 6515099"/>
+              <a:gd name="connsiteY7" fmla="*/ 0 h 6641968"/>
+              <a:gd name="connsiteX8" fmla="*/ 5194311 w 6515099"/>
+              <a:gd name="connsiteY8" fmla="*/ 0 h 6641968"/>
+              <a:gd name="connsiteX9" fmla="*/ 5786592 w 6515099"/>
+              <a:gd name="connsiteY9" fmla="*/ 0 h 6641968"/>
+              <a:gd name="connsiteX10" fmla="*/ 6515099 w 6515099"/>
+              <a:gd name="connsiteY10" fmla="*/ 0 h 6641968"/>
+              <a:gd name="connsiteX11" fmla="*/ 6515099 w 6515099"/>
+              <a:gd name="connsiteY11" fmla="*/ 354238 h 6641968"/>
+              <a:gd name="connsiteX12" fmla="*/ 6515099 w 6515099"/>
+              <a:gd name="connsiteY12" fmla="*/ 974155 h 6641968"/>
+              <a:gd name="connsiteX13" fmla="*/ 6515099 w 6515099"/>
+              <a:gd name="connsiteY13" fmla="*/ 1394813 h 6641968"/>
+              <a:gd name="connsiteX14" fmla="*/ 6515099 w 6515099"/>
+              <a:gd name="connsiteY14" fmla="*/ 2014730 h 6641968"/>
+              <a:gd name="connsiteX15" fmla="*/ 6515099 w 6515099"/>
+              <a:gd name="connsiteY15" fmla="*/ 2501808 h 6641968"/>
+              <a:gd name="connsiteX16" fmla="*/ 6515099 w 6515099"/>
+              <a:gd name="connsiteY16" fmla="*/ 2922466 h 6641968"/>
+              <a:gd name="connsiteX17" fmla="*/ 6515099 w 6515099"/>
+              <a:gd name="connsiteY17" fmla="*/ 3276704 h 6641968"/>
+              <a:gd name="connsiteX18" fmla="*/ 6515099 w 6515099"/>
+              <a:gd name="connsiteY18" fmla="*/ 3697362 h 6641968"/>
+              <a:gd name="connsiteX19" fmla="*/ 6515099 w 6515099"/>
+              <a:gd name="connsiteY19" fmla="*/ 4118020 h 6641968"/>
+              <a:gd name="connsiteX20" fmla="*/ 6515099 w 6515099"/>
+              <a:gd name="connsiteY20" fmla="*/ 4671517 h 6641968"/>
+              <a:gd name="connsiteX21" fmla="*/ 6515099 w 6515099"/>
+              <a:gd name="connsiteY21" fmla="*/ 5225015 h 6641968"/>
+              <a:gd name="connsiteX22" fmla="*/ 6515099 w 6515099"/>
+              <a:gd name="connsiteY22" fmla="*/ 5712092 h 6641968"/>
+              <a:gd name="connsiteX23" fmla="*/ 6515099 w 6515099"/>
+              <a:gd name="connsiteY23" fmla="*/ 6641968 h 6641968"/>
+              <a:gd name="connsiteX24" fmla="*/ 6053119 w 6515099"/>
+              <a:gd name="connsiteY24" fmla="*/ 6641968 h 6641968"/>
+              <a:gd name="connsiteX25" fmla="*/ 5460838 w 6515099"/>
+              <a:gd name="connsiteY25" fmla="*/ 6641968 h 6641968"/>
+              <a:gd name="connsiteX26" fmla="*/ 4803405 w 6515099"/>
+              <a:gd name="connsiteY26" fmla="*/ 6641968 h 6641968"/>
+              <a:gd name="connsiteX27" fmla="*/ 4406576 w 6515099"/>
+              <a:gd name="connsiteY27" fmla="*/ 6641968 h 6641968"/>
+              <a:gd name="connsiteX28" fmla="*/ 3683992 w 6515099"/>
+              <a:gd name="connsiteY28" fmla="*/ 6641968 h 6641968"/>
+              <a:gd name="connsiteX29" fmla="*/ 3156862 w 6515099"/>
+              <a:gd name="connsiteY29" fmla="*/ 6641968 h 6641968"/>
+              <a:gd name="connsiteX30" fmla="*/ 2499429 w 6515099"/>
+              <a:gd name="connsiteY30" fmla="*/ 6641968 h 6641968"/>
+              <a:gd name="connsiteX31" fmla="*/ 2102600 w 6515099"/>
+              <a:gd name="connsiteY31" fmla="*/ 6641968 h 6641968"/>
+              <a:gd name="connsiteX32" fmla="*/ 1380016 w 6515099"/>
+              <a:gd name="connsiteY32" fmla="*/ 6641968 h 6641968"/>
+              <a:gd name="connsiteX33" fmla="*/ 852886 w 6515099"/>
+              <a:gd name="connsiteY33" fmla="*/ 6641968 h 6641968"/>
+              <a:gd name="connsiteX34" fmla="*/ 0 w 6515099"/>
+              <a:gd name="connsiteY34" fmla="*/ 6641968 h 6641968"/>
+              <a:gd name="connsiteX35" fmla="*/ 0 w 6515099"/>
+              <a:gd name="connsiteY35" fmla="*/ 6221310 h 6641968"/>
+              <a:gd name="connsiteX36" fmla="*/ 0 w 6515099"/>
+              <a:gd name="connsiteY36" fmla="*/ 5534973 h 6641968"/>
+              <a:gd name="connsiteX37" fmla="*/ 0 w 6515099"/>
+              <a:gd name="connsiteY37" fmla="*/ 5180735 h 6641968"/>
+              <a:gd name="connsiteX38" fmla="*/ 0 w 6515099"/>
+              <a:gd name="connsiteY38" fmla="*/ 4627238 h 6641968"/>
+              <a:gd name="connsiteX39" fmla="*/ 0 w 6515099"/>
+              <a:gd name="connsiteY39" fmla="*/ 4272999 h 6641968"/>
+              <a:gd name="connsiteX40" fmla="*/ 0 w 6515099"/>
+              <a:gd name="connsiteY40" fmla="*/ 3653082 h 6641968"/>
+              <a:gd name="connsiteX41" fmla="*/ 0 w 6515099"/>
+              <a:gd name="connsiteY41" fmla="*/ 3099585 h 6641968"/>
+              <a:gd name="connsiteX42" fmla="*/ 0 w 6515099"/>
+              <a:gd name="connsiteY42" fmla="*/ 2479668 h 6641968"/>
+              <a:gd name="connsiteX43" fmla="*/ 0 w 6515099"/>
+              <a:gd name="connsiteY43" fmla="*/ 1926171 h 6641968"/>
+              <a:gd name="connsiteX44" fmla="*/ 0 w 6515099"/>
+              <a:gd name="connsiteY44" fmla="*/ 1306254 h 6641968"/>
+              <a:gd name="connsiteX45" fmla="*/ 0 w 6515099"/>
+              <a:gd name="connsiteY45" fmla="*/ 686337 h 6641968"/>
+              <a:gd name="connsiteX46" fmla="*/ 0 w 6515099"/>
+              <a:gd name="connsiteY46" fmla="*/ 0 h 6641968"/>
+            </a:gdLst>
+            <a:ahLst/>
+            <a:cxnLst>
+              <a:cxn ang="0">
+                <a:pos x="connsiteX0" y="connsiteY0"/>
+              </a:cxn>
+              <a:cxn ang="0">
+                <a:pos x="connsiteX1" y="connsiteY1"/>
+              </a:cxn>
+              <a:cxn ang="0">
+                <a:pos x="connsiteX2" y="connsiteY2"/>
+              </a:cxn>
+              <a:cxn ang="0">
+                <a:pos x="connsiteX3" y="connsiteY3"/>
+              </a:cxn>
+              <a:cxn ang="0">
+                <a:pos x="connsiteX4" y="connsiteY4"/>
+              </a:cxn>
+              <a:cxn ang="0">
+                <a:pos x="connsiteX5" y="connsiteY5"/>
+              </a:cxn>
+              <a:cxn ang="0">
+                <a:pos x="connsiteX6" y="connsiteY6"/>
+              </a:cxn>
+              <a:cxn ang="0">
+                <a:pos x="connsiteX7" y="connsiteY7"/>
+              </a:cxn>
+              <a:cxn ang="0">
+                <a:pos x="connsiteX8" y="connsiteY8"/>
+              </a:cxn>
+              <a:cxn ang="0">
+                <a:pos x="connsiteX9" y="connsiteY9"/>
+              </a:cxn>
+              <a:cxn ang="0">
+                <a:pos x="connsiteX10" y="connsiteY10"/>
+              </a:cxn>
+              <a:cxn ang="0">
+                <a:pos x="connsiteX11" y="connsiteY11"/>
+              </a:cxn>
+              <a:cxn ang="0">
+                <a:pos x="connsiteX12" y="connsiteY12"/>
+              </a:cxn>
+              <a:cxn ang="0">
+                <a:pos x="connsiteX13" y="connsiteY13"/>
+              </a:cxn>
+              <a:cxn ang="0">
+                <a:pos x="connsiteX14" y="connsiteY14"/>
+              </a:cxn>
+              <a:cxn ang="0">
+                <a:pos x="connsiteX15" y="connsiteY15"/>
+              </a:cxn>
+              <a:cxn ang="0">
+                <a:pos x="connsiteX16" y="connsiteY16"/>
+              </a:cxn>
+              <a:cxn ang="0">
+                <a:pos x="connsiteX17" y="connsiteY17"/>
+              </a:cxn>
+              <a:cxn ang="0">
+                <a:pos x="connsiteX18" y="connsiteY18"/>
+              </a:cxn>
+              <a:cxn ang="0">
+                <a:pos x="connsiteX19" y="connsiteY19"/>
+              </a:cxn>
+              <a:cxn ang="0">
+                <a:pos x="connsiteX20" y="connsiteY20"/>
+              </a:cxn>
+              <a:cxn ang="0">
+                <a:pos x="connsiteX21" y="connsiteY21"/>
+              </a:cxn>
+              <a:cxn ang="0">
+                <a:pos x="connsiteX22" y="connsiteY22"/>
+              </a:cxn>
+              <a:cxn ang="0">
+                <a:pos x="connsiteX23" y="connsiteY23"/>
+              </a:cxn>
+              <a:cxn ang="0">
+                <a:pos x="connsiteX24" y="connsiteY24"/>
+              </a:cxn>
+              <a:cxn ang="0">
+                <a:pos x="connsiteX25" y="connsiteY25"/>
+              </a:cxn>
+              <a:cxn ang="0">
+                <a:pos x="connsiteX26" y="connsiteY26"/>
+              </a:cxn>
+              <a:cxn ang="0">
+                <a:pos x="connsiteX27" y="connsiteY27"/>
+              </a:cxn>
+              <a:cxn ang="0">
+                <a:pos x="connsiteX28" y="connsiteY28"/>
+              </a:cxn>
+              <a:cxn ang="0">
+                <a:pos x="connsiteX29" y="connsiteY29"/>
+              </a:cxn>
+              <a:cxn ang="0">
+                <a:pos x="connsiteX30" y="connsiteY30"/>
+              </a:cxn>
+              <a:cxn ang="0">
+                <a:pos x="connsiteX31" y="connsiteY31"/>
+              </a:cxn>
+              <a:cxn ang="0">
+                <a:pos x="connsiteX32" y="connsiteY32"/>
+              </a:cxn>
+              <a:cxn ang="0">
+                <a:pos x="connsiteX33" y="connsiteY33"/>
+              </a:cxn>
+              <a:cxn ang="0">
+                <a:pos x="connsiteX34" y="connsiteY34"/>
+              </a:cxn>
+              <a:cxn ang="0">
+                <a:pos x="connsiteX35" y="connsiteY35"/>
+              </a:cxn>
+              <a:cxn ang="0">
+                <a:pos x="connsiteX36" y="connsiteY36"/>
+              </a:cxn>
+              <a:cxn ang="0">
+                <a:pos x="connsiteX37" y="connsiteY37"/>
+              </a:cxn>
+              <a:cxn ang="0">
+                <a:pos x="connsiteX38" y="connsiteY38"/>
+              </a:cxn>
+              <a:cxn ang="0">
+                <a:pos x="connsiteX39" y="connsiteY39"/>
+              </a:cxn>
+              <a:cxn ang="0">
+                <a:pos x="connsiteX40" y="connsiteY40"/>
+              </a:cxn>
+              <a:cxn ang="0">
+                <a:pos x="connsiteX41" y="connsiteY41"/>
+              </a:cxn>
+              <a:cxn ang="0">
+                <a:pos x="connsiteX42" y="connsiteY42"/>
+              </a:cxn>
+              <a:cxn ang="0">
+                <a:pos x="connsiteX43" y="connsiteY43"/>
+              </a:cxn>
+              <a:cxn ang="0">
+                <a:pos x="connsiteX44" y="connsiteY44"/>
+              </a:cxn>
+              <a:cxn ang="0">
+                <a:pos x="connsiteX45" y="connsiteY45"/>
+              </a:cxn>
+              <a:cxn ang="0">
+                <a:pos x="connsiteX46" y="connsiteY46"/>
+              </a:cxn>
+            </a:cxnLst>
+            <a:rect l="l" t="t" r="r" b="b"/>
+            <a:pathLst>
+              <a:path w="6515099" h="6641968" fill="none" extrusionOk="0">
+                <a:moveTo>
+                  <a:pt x="0" y="0"/>
+                </a:moveTo>
+                <a:cubicBezTo>
+                  <a:pt x="267914" y="-63324"/>
+                  <a:pt x="487773" y="3502"/>
+                  <a:pt x="657433" y="0"/>
+                </a:cubicBezTo>
+                <a:cubicBezTo>
+                  <a:pt x="827093" y="-3502"/>
+                  <a:pt x="1022992" y="32449"/>
+                  <a:pt x="1314865" y="0"/>
+                </a:cubicBezTo>
+                <a:cubicBezTo>
+                  <a:pt x="1606738" y="-32449"/>
+                  <a:pt x="1656926" y="24363"/>
+                  <a:pt x="1972298" y="0"/>
+                </a:cubicBezTo>
+                <a:cubicBezTo>
+                  <a:pt x="2287670" y="-24363"/>
+                  <a:pt x="2497268" y="18267"/>
+                  <a:pt x="2629731" y="0"/>
+                </a:cubicBezTo>
+                <a:cubicBezTo>
+                  <a:pt x="2762194" y="-18267"/>
+                  <a:pt x="3159100" y="63595"/>
+                  <a:pt x="3352315" y="0"/>
+                </a:cubicBezTo>
+                <a:cubicBezTo>
+                  <a:pt x="3545530" y="-63595"/>
+                  <a:pt x="3661914" y="23504"/>
+                  <a:pt x="3944596" y="0"/>
+                </a:cubicBezTo>
+                <a:cubicBezTo>
+                  <a:pt x="4227278" y="-23504"/>
+                  <a:pt x="4319578" y="5427"/>
+                  <a:pt x="4602029" y="0"/>
+                </a:cubicBezTo>
+                <a:cubicBezTo>
+                  <a:pt x="4884480" y="-5427"/>
+                  <a:pt x="5056803" y="66242"/>
+                  <a:pt x="5194311" y="0"/>
+                </a:cubicBezTo>
+                <a:cubicBezTo>
+                  <a:pt x="5331819" y="-66242"/>
+                  <a:pt x="5585193" y="65641"/>
+                  <a:pt x="5786592" y="0"/>
+                </a:cubicBezTo>
+                <a:cubicBezTo>
+                  <a:pt x="5987991" y="-65641"/>
+                  <a:pt x="6196699" y="22746"/>
+                  <a:pt x="6515099" y="0"/>
+                </a:cubicBezTo>
+                <a:cubicBezTo>
+                  <a:pt x="6516202" y="110074"/>
+                  <a:pt x="6497663" y="193438"/>
+                  <a:pt x="6515099" y="354238"/>
+                </a:cubicBezTo>
+                <a:cubicBezTo>
+                  <a:pt x="6532535" y="515038"/>
+                  <a:pt x="6452376" y="753650"/>
+                  <a:pt x="6515099" y="974155"/>
+                </a:cubicBezTo>
+                <a:cubicBezTo>
+                  <a:pt x="6577822" y="1194660"/>
+                  <a:pt x="6477211" y="1267390"/>
+                  <a:pt x="6515099" y="1394813"/>
+                </a:cubicBezTo>
+                <a:cubicBezTo>
+                  <a:pt x="6552987" y="1522236"/>
+                  <a:pt x="6452743" y="1833207"/>
+                  <a:pt x="6515099" y="2014730"/>
+                </a:cubicBezTo>
+                <a:cubicBezTo>
+                  <a:pt x="6577455" y="2196253"/>
+                  <a:pt x="6493850" y="2261830"/>
+                  <a:pt x="6515099" y="2501808"/>
+                </a:cubicBezTo>
+                <a:cubicBezTo>
+                  <a:pt x="6536348" y="2741786"/>
+                  <a:pt x="6514425" y="2737123"/>
+                  <a:pt x="6515099" y="2922466"/>
+                </a:cubicBezTo>
+                <a:cubicBezTo>
+                  <a:pt x="6515773" y="3107809"/>
+                  <a:pt x="6507903" y="3204881"/>
+                  <a:pt x="6515099" y="3276704"/>
+                </a:cubicBezTo>
+                <a:cubicBezTo>
+                  <a:pt x="6522295" y="3348527"/>
+                  <a:pt x="6472245" y="3551716"/>
+                  <a:pt x="6515099" y="3697362"/>
+                </a:cubicBezTo>
+                <a:cubicBezTo>
+                  <a:pt x="6557953" y="3843008"/>
+                  <a:pt x="6505471" y="3965311"/>
+                  <a:pt x="6515099" y="4118020"/>
+                </a:cubicBezTo>
+                <a:cubicBezTo>
+                  <a:pt x="6524727" y="4270729"/>
+                  <a:pt x="6510802" y="4558781"/>
+                  <a:pt x="6515099" y="4671517"/>
+                </a:cubicBezTo>
+                <a:cubicBezTo>
+                  <a:pt x="6519396" y="4784253"/>
+                  <a:pt x="6467830" y="4974059"/>
+                  <a:pt x="6515099" y="5225015"/>
+                </a:cubicBezTo>
+                <a:cubicBezTo>
+                  <a:pt x="6562368" y="5475971"/>
+                  <a:pt x="6471076" y="5571260"/>
+                  <a:pt x="6515099" y="5712092"/>
+                </a:cubicBezTo>
+                <a:cubicBezTo>
+                  <a:pt x="6559122" y="5852924"/>
+                  <a:pt x="6414072" y="6187388"/>
+                  <a:pt x="6515099" y="6641968"/>
+                </a:cubicBezTo>
+                <a:cubicBezTo>
+                  <a:pt x="6350386" y="6686068"/>
+                  <a:pt x="6160392" y="6609874"/>
+                  <a:pt x="6053119" y="6641968"/>
+                </a:cubicBezTo>
+                <a:cubicBezTo>
+                  <a:pt x="5945846" y="6674062"/>
+                  <a:pt x="5583799" y="6639808"/>
+                  <a:pt x="5460838" y="6641968"/>
+                </a:cubicBezTo>
+                <a:cubicBezTo>
+                  <a:pt x="5337877" y="6644128"/>
+                  <a:pt x="5014489" y="6566095"/>
+                  <a:pt x="4803405" y="6641968"/>
+                </a:cubicBezTo>
+                <a:cubicBezTo>
+                  <a:pt x="4592321" y="6717841"/>
+                  <a:pt x="4535479" y="6611402"/>
+                  <a:pt x="4406576" y="6641968"/>
+                </a:cubicBezTo>
+                <a:cubicBezTo>
+                  <a:pt x="4277673" y="6672534"/>
+                  <a:pt x="3860486" y="6621533"/>
+                  <a:pt x="3683992" y="6641968"/>
+                </a:cubicBezTo>
+                <a:cubicBezTo>
+                  <a:pt x="3507498" y="6662403"/>
+                  <a:pt x="3355642" y="6586304"/>
+                  <a:pt x="3156862" y="6641968"/>
+                </a:cubicBezTo>
+                <a:cubicBezTo>
+                  <a:pt x="2958082" y="6697632"/>
+                  <a:pt x="2739083" y="6586962"/>
+                  <a:pt x="2499429" y="6641968"/>
+                </a:cubicBezTo>
+                <a:cubicBezTo>
+                  <a:pt x="2259775" y="6696974"/>
+                  <a:pt x="2236643" y="6594848"/>
+                  <a:pt x="2102600" y="6641968"/>
+                </a:cubicBezTo>
+                <a:cubicBezTo>
+                  <a:pt x="1968557" y="6689088"/>
+                  <a:pt x="1681287" y="6582013"/>
+                  <a:pt x="1380016" y="6641968"/>
+                </a:cubicBezTo>
+                <a:cubicBezTo>
+                  <a:pt x="1078745" y="6701923"/>
+                  <a:pt x="1098389" y="6585281"/>
+                  <a:pt x="852886" y="6641968"/>
+                </a:cubicBezTo>
+                <a:cubicBezTo>
+                  <a:pt x="607383" y="6698655"/>
+                  <a:pt x="186353" y="6553018"/>
+                  <a:pt x="0" y="6641968"/>
+                </a:cubicBezTo>
+                <a:cubicBezTo>
+                  <a:pt x="-43194" y="6519308"/>
+                  <a:pt x="40699" y="6364607"/>
+                  <a:pt x="0" y="6221310"/>
+                </a:cubicBezTo>
+                <a:cubicBezTo>
+                  <a:pt x="-40699" y="6078013"/>
+                  <a:pt x="27231" y="5718516"/>
+                  <a:pt x="0" y="5534973"/>
+                </a:cubicBezTo>
+                <a:cubicBezTo>
+                  <a:pt x="-27231" y="5351430"/>
+                  <a:pt x="40585" y="5329103"/>
+                  <a:pt x="0" y="5180735"/>
+                </a:cubicBezTo>
+                <a:cubicBezTo>
+                  <a:pt x="-40585" y="5032367"/>
+                  <a:pt x="39022" y="4841838"/>
+                  <a:pt x="0" y="4627238"/>
+                </a:cubicBezTo>
+                <a:cubicBezTo>
+                  <a:pt x="-39022" y="4412638"/>
+                  <a:pt x="32952" y="4439907"/>
+                  <a:pt x="0" y="4272999"/>
+                </a:cubicBezTo>
+                <a:cubicBezTo>
+                  <a:pt x="-32952" y="4106091"/>
+                  <a:pt x="958" y="3924331"/>
+                  <a:pt x="0" y="3653082"/>
+                </a:cubicBezTo>
+                <a:cubicBezTo>
+                  <a:pt x="-958" y="3381833"/>
+                  <a:pt x="47533" y="3233929"/>
+                  <a:pt x="0" y="3099585"/>
+                </a:cubicBezTo>
+                <a:cubicBezTo>
+                  <a:pt x="-47533" y="2965241"/>
+                  <a:pt x="41849" y="2727950"/>
+                  <a:pt x="0" y="2479668"/>
+                </a:cubicBezTo>
+                <a:cubicBezTo>
+                  <a:pt x="-41849" y="2231386"/>
+                  <a:pt x="46600" y="2161671"/>
+                  <a:pt x="0" y="1926171"/>
+                </a:cubicBezTo>
+                <a:cubicBezTo>
+                  <a:pt x="-46600" y="1690671"/>
+                  <a:pt x="33223" y="1435152"/>
+                  <a:pt x="0" y="1306254"/>
+                </a:cubicBezTo>
+                <a:cubicBezTo>
+                  <a:pt x="-33223" y="1177356"/>
+                  <a:pt x="50523" y="884107"/>
+                  <a:pt x="0" y="686337"/>
+                </a:cubicBezTo>
+                <a:cubicBezTo>
+                  <a:pt x="-50523" y="488567"/>
+                  <a:pt x="6294" y="189306"/>
+                  <a:pt x="0" y="0"/>
+                </a:cubicBezTo>
+                <a:close/>
+              </a:path>
+              <a:path w="6515099" h="6641968" stroke="0" extrusionOk="0">
+                <a:moveTo>
+                  <a:pt x="0" y="0"/>
+                </a:moveTo>
+                <a:cubicBezTo>
+                  <a:pt x="127104" y="-49547"/>
+                  <a:pt x="359888" y="12352"/>
+                  <a:pt x="527131" y="0"/>
+                </a:cubicBezTo>
+                <a:cubicBezTo>
+                  <a:pt x="694374" y="-12352"/>
+                  <a:pt x="826920" y="45986"/>
+                  <a:pt x="923959" y="0"/>
+                </a:cubicBezTo>
+                <a:cubicBezTo>
+                  <a:pt x="1020998" y="-45986"/>
+                  <a:pt x="1343903" y="659"/>
+                  <a:pt x="1646543" y="0"/>
+                </a:cubicBezTo>
+                <a:cubicBezTo>
+                  <a:pt x="1949183" y="-659"/>
+                  <a:pt x="1995466" y="62852"/>
+                  <a:pt x="2173674" y="0"/>
+                </a:cubicBezTo>
+                <a:cubicBezTo>
+                  <a:pt x="2351882" y="-62852"/>
+                  <a:pt x="2544702" y="55348"/>
+                  <a:pt x="2700805" y="0"/>
+                </a:cubicBezTo>
+                <a:cubicBezTo>
+                  <a:pt x="2856908" y="-55348"/>
+                  <a:pt x="3083864" y="53521"/>
+                  <a:pt x="3423388" y="0"/>
+                </a:cubicBezTo>
+                <a:cubicBezTo>
+                  <a:pt x="3762912" y="-53521"/>
+                  <a:pt x="3766469" y="53681"/>
+                  <a:pt x="3885368" y="0"/>
+                </a:cubicBezTo>
+                <a:cubicBezTo>
+                  <a:pt x="4004267" y="-53681"/>
+                  <a:pt x="4273414" y="79607"/>
+                  <a:pt x="4607952" y="0"/>
+                </a:cubicBezTo>
+                <a:cubicBezTo>
+                  <a:pt x="4942490" y="-79607"/>
+                  <a:pt x="5116807" y="6003"/>
+                  <a:pt x="5330536" y="0"/>
+                </a:cubicBezTo>
+                <a:cubicBezTo>
+                  <a:pt x="5544265" y="-6003"/>
+                  <a:pt x="5688449" y="53147"/>
+                  <a:pt x="5922817" y="0"/>
+                </a:cubicBezTo>
+                <a:cubicBezTo>
+                  <a:pt x="6157185" y="-53147"/>
+                  <a:pt x="6319099" y="31111"/>
+                  <a:pt x="6515099" y="0"/>
+                </a:cubicBezTo>
+                <a:cubicBezTo>
+                  <a:pt x="6519773" y="150916"/>
+                  <a:pt x="6480977" y="292189"/>
+                  <a:pt x="6515099" y="487078"/>
+                </a:cubicBezTo>
+                <a:cubicBezTo>
+                  <a:pt x="6549221" y="681967"/>
+                  <a:pt x="6488972" y="730886"/>
+                  <a:pt x="6515099" y="841316"/>
+                </a:cubicBezTo>
+                <a:cubicBezTo>
+                  <a:pt x="6541226" y="951746"/>
+                  <a:pt x="6487964" y="1256245"/>
+                  <a:pt x="6515099" y="1394813"/>
+                </a:cubicBezTo>
+                <a:cubicBezTo>
+                  <a:pt x="6542234" y="1533381"/>
+                  <a:pt x="6495631" y="1773737"/>
+                  <a:pt x="6515099" y="1948311"/>
+                </a:cubicBezTo>
+                <a:cubicBezTo>
+                  <a:pt x="6534567" y="2122885"/>
+                  <a:pt x="6508519" y="2366040"/>
+                  <a:pt x="6515099" y="2501808"/>
+                </a:cubicBezTo>
+                <a:cubicBezTo>
+                  <a:pt x="6521679" y="2637576"/>
+                  <a:pt x="6479699" y="2969107"/>
+                  <a:pt x="6515099" y="3121725"/>
+                </a:cubicBezTo>
+                <a:cubicBezTo>
+                  <a:pt x="6550499" y="3274343"/>
+                  <a:pt x="6500683" y="3556862"/>
+                  <a:pt x="6515099" y="3741642"/>
+                </a:cubicBezTo>
+                <a:cubicBezTo>
+                  <a:pt x="6529515" y="3926422"/>
+                  <a:pt x="6451347" y="4087464"/>
+                  <a:pt x="6515099" y="4361559"/>
+                </a:cubicBezTo>
+                <a:cubicBezTo>
+                  <a:pt x="6578851" y="4635654"/>
+                  <a:pt x="6497708" y="4568806"/>
+                  <a:pt x="6515099" y="4715797"/>
+                </a:cubicBezTo>
+                <a:cubicBezTo>
+                  <a:pt x="6532490" y="4862788"/>
+                  <a:pt x="6467477" y="5037027"/>
+                  <a:pt x="6515099" y="5136455"/>
+                </a:cubicBezTo>
+                <a:cubicBezTo>
+                  <a:pt x="6562721" y="5235883"/>
+                  <a:pt x="6492134" y="5611798"/>
+                  <a:pt x="6515099" y="5756372"/>
+                </a:cubicBezTo>
+                <a:cubicBezTo>
+                  <a:pt x="6538064" y="5900946"/>
+                  <a:pt x="6430305" y="6316949"/>
+                  <a:pt x="6515099" y="6641968"/>
+                </a:cubicBezTo>
+                <a:cubicBezTo>
+                  <a:pt x="6284160" y="6679776"/>
+                  <a:pt x="6219405" y="6602940"/>
+                  <a:pt x="6053119" y="6641968"/>
+                </a:cubicBezTo>
+                <a:cubicBezTo>
+                  <a:pt x="5886833" y="6680996"/>
+                  <a:pt x="5839742" y="6625267"/>
+                  <a:pt x="5656290" y="6641968"/>
+                </a:cubicBezTo>
+                <a:cubicBezTo>
+                  <a:pt x="5472838" y="6658669"/>
+                  <a:pt x="5452807" y="6635635"/>
+                  <a:pt x="5259462" y="6641968"/>
+                </a:cubicBezTo>
+                <a:cubicBezTo>
+                  <a:pt x="5066117" y="6648301"/>
+                  <a:pt x="4827788" y="6630801"/>
+                  <a:pt x="4667180" y="6641968"/>
+                </a:cubicBezTo>
+                <a:cubicBezTo>
+                  <a:pt x="4506572" y="6653135"/>
+                  <a:pt x="4418911" y="6597049"/>
+                  <a:pt x="4205200" y="6641968"/>
+                </a:cubicBezTo>
+                <a:cubicBezTo>
+                  <a:pt x="3991489" y="6686887"/>
+                  <a:pt x="3726578" y="6609635"/>
+                  <a:pt x="3547768" y="6641968"/>
+                </a:cubicBezTo>
+                <a:cubicBezTo>
+                  <a:pt x="3368958" y="6674301"/>
+                  <a:pt x="3230992" y="6606183"/>
+                  <a:pt x="3085788" y="6641968"/>
+                </a:cubicBezTo>
+                <a:cubicBezTo>
+                  <a:pt x="2940584" y="6677753"/>
+                  <a:pt x="2600771" y="6585999"/>
+                  <a:pt x="2428355" y="6641968"/>
+                </a:cubicBezTo>
+                <a:cubicBezTo>
+                  <a:pt x="2255939" y="6697937"/>
+                  <a:pt x="2137600" y="6624584"/>
+                  <a:pt x="2031526" y="6641968"/>
+                </a:cubicBezTo>
+                <a:cubicBezTo>
+                  <a:pt x="1925452" y="6659352"/>
+                  <a:pt x="1558054" y="6620828"/>
+                  <a:pt x="1374094" y="6641968"/>
+                </a:cubicBezTo>
+                <a:cubicBezTo>
+                  <a:pt x="1190134" y="6663108"/>
+                  <a:pt x="1009180" y="6606827"/>
+                  <a:pt x="912114" y="6641968"/>
+                </a:cubicBezTo>
+                <a:cubicBezTo>
+                  <a:pt x="815048" y="6677109"/>
+                  <a:pt x="675705" y="6598588"/>
+                  <a:pt x="515285" y="6641968"/>
+                </a:cubicBezTo>
+                <a:cubicBezTo>
+                  <a:pt x="354865" y="6685348"/>
+                  <a:pt x="251106" y="6618322"/>
+                  <a:pt x="0" y="6641968"/>
+                </a:cubicBezTo>
+                <a:cubicBezTo>
+                  <a:pt x="-8995" y="6486240"/>
+                  <a:pt x="45167" y="6310113"/>
+                  <a:pt x="0" y="6022051"/>
+                </a:cubicBezTo>
+                <a:cubicBezTo>
+                  <a:pt x="-45167" y="5733989"/>
+                  <a:pt x="42907" y="5760095"/>
+                  <a:pt x="0" y="5601393"/>
+                </a:cubicBezTo>
+                <a:cubicBezTo>
+                  <a:pt x="-42907" y="5442691"/>
+                  <a:pt x="8053" y="5373999"/>
+                  <a:pt x="0" y="5247155"/>
+                </a:cubicBezTo>
+                <a:cubicBezTo>
+                  <a:pt x="-8053" y="5120311"/>
+                  <a:pt x="6025" y="5024608"/>
+                  <a:pt x="0" y="4892916"/>
+                </a:cubicBezTo>
+                <a:cubicBezTo>
+                  <a:pt x="-6025" y="4761224"/>
+                  <a:pt x="43206" y="4465747"/>
+                  <a:pt x="0" y="4272999"/>
+                </a:cubicBezTo>
+                <a:cubicBezTo>
+                  <a:pt x="-43206" y="4080251"/>
+                  <a:pt x="1926" y="4077643"/>
+                  <a:pt x="0" y="3918761"/>
+                </a:cubicBezTo>
+                <a:cubicBezTo>
+                  <a:pt x="-1926" y="3759879"/>
+                  <a:pt x="20670" y="3481603"/>
+                  <a:pt x="0" y="3365264"/>
+                </a:cubicBezTo>
+                <a:cubicBezTo>
+                  <a:pt x="-20670" y="3248925"/>
+                  <a:pt x="7244" y="3059394"/>
+                  <a:pt x="0" y="2944606"/>
+                </a:cubicBezTo>
+                <a:cubicBezTo>
+                  <a:pt x="-7244" y="2829818"/>
+                  <a:pt x="35688" y="2603455"/>
+                  <a:pt x="0" y="2391108"/>
+                </a:cubicBezTo>
+                <a:cubicBezTo>
+                  <a:pt x="-35688" y="2178761"/>
+                  <a:pt x="3065" y="2066602"/>
+                  <a:pt x="0" y="1837611"/>
+                </a:cubicBezTo>
+                <a:cubicBezTo>
+                  <a:pt x="-3065" y="1608620"/>
+                  <a:pt x="12641" y="1463625"/>
+                  <a:pt x="0" y="1284114"/>
+                </a:cubicBezTo>
+                <a:cubicBezTo>
+                  <a:pt x="-12641" y="1104603"/>
+                  <a:pt x="5300" y="889697"/>
+                  <a:pt x="0" y="730616"/>
+                </a:cubicBezTo>
+                <a:cubicBezTo>
+                  <a:pt x="-5300" y="571535"/>
+                  <a:pt x="24127" y="222612"/>
+                  <a:pt x="0" y="0"/>
+                </a:cubicBezTo>
+                <a:close/>
+              </a:path>
+            </a:pathLst>
+          </a:custGeom>
+          <a:solidFill>
+            <a:schemeClr val="bg1"/>
+          </a:solidFill>
+          <a:ln w="38100">
+            <a:solidFill>
+              <a:schemeClr val="tx1"/>
+            </a:solidFill>
+            <a:extLst>
+              <a:ext uri="{C807C97D-BFC1-408E-A445-0C87EB9F89A2}">
+                <ask:lineSketchStyleProps xmlns:ask="http://schemas.microsoft.com/office/drawing/2018/sketchyshapes" sd="1219033472">
+                  <a:prstGeom prst="rect">
+                    <a:avLst/>
+                  </a:prstGeom>
+                  <ask:type>
+                    <ask:lineSketchScribble/>
+                  </ask:type>
+                </ask:lineSketchStyleProps>
+              </a:ext>
+            </a:extLst>
+          </a:ln>
+        </p:spPr>
+        <p:style>
+          <a:lnRef idx="2">
+            <a:schemeClr val="accent1">
+              <a:shade val="50000"/>
+            </a:schemeClr>
+          </a:lnRef>
+          <a:fillRef idx="1">
+            <a:schemeClr val="accent1"/>
+          </a:fillRef>
+          <a:effectRef idx="0">
+            <a:schemeClr val="accent1"/>
+          </a:effectRef>
+          <a:fontRef idx="minor">
+            <a:schemeClr val="lt1"/>
+          </a:fontRef>
+        </p:style>
+        <p:txBody>
+          <a:bodyPr rtlCol="0" anchor="ctr"/>
+          <a:lstStyle/>
+          <a:p>
+            <a:pPr algn="ctr"/>
+            <a:endParaRPr lang="de-DE" dirty="0"/>
+          </a:p>
+        </p:txBody>
+      </p:sp>
+      <p:sp>
+        <p:nvSpPr>
           <p:cNvPr id="11" name="Abgerundetes Rechteck 10">
             <a:extLst>
               <a:ext uri="{FF2B5EF4-FFF2-40B4-BE49-F238E27FC236}">
@@ -5329,7 +7717,7 @@
         <p:spPr>
           <a:xfrm>
             <a:off x="971821" y="1502071"/>
-            <a:ext cx="5014912" cy="2585323"/>
+            <a:ext cx="5014912" cy="2308324"/>
           </a:xfrm>
           <a:prstGeom prst="rect">
             <a:avLst/>
@@ -5346,7 +7734,7 @@
               <a:rPr lang="de-DE" dirty="0">
                 <a:latin typeface="Ubuntu" panose="020B0504030602030204" pitchFamily="34" charset="0"/>
               </a:rPr>
-              <a:t>Wie du siehst, das Haus ist für Steve oder Alex zu klein - nur die RoboSchildkröte passt rein!</a:t>
+              <a:t>Wie Du siehst, ist das Haus für Steve oder Alex zu klein - nur die RoboSchildkröte passt rein!</a:t>
             </a:r>
           </a:p>
           <a:p>
@@ -5359,7 +7747,19 @@
               <a:rPr lang="de-DE" b="1" dirty="0">
                 <a:latin typeface="Ubuntu" panose="020B0504030602030204" pitchFamily="34" charset="0"/>
               </a:rPr>
-              <a:t>Deine Aufgabe: Erkunde das Haus – in inneren gibt es einen versteckten Gegenstande! </a:t>
+              <a:t>Deine Aufgabe: Erkunde das Haus </a:t>
+            </a:r>
+            <a:r>
+              <a:rPr lang="de-DE" b="1">
+                <a:latin typeface="Ubuntu" panose="020B0504030602030204" pitchFamily="34" charset="0"/>
+              </a:rPr>
+              <a:t>– innen </a:t>
+            </a:r>
+            <a:r>
+              <a:rPr lang="de-DE" b="1" dirty="0">
+                <a:latin typeface="Ubuntu" panose="020B0504030602030204" pitchFamily="34" charset="0"/>
+              </a:rPr>
+              <a:t>gibt es einen versteckten Gegenstande! </a:t>
             </a:r>
           </a:p>
           <a:p>

</xml_diff>

<commit_message>
Lernkarten: - farben reduziert - installationskarte
</commit_message>
<xml_diff>
--- a/Lernkarten/Level1 - Einführung.pptx
+++ b/Lernkarten/Level1 - Einführung.pptx
@@ -203,7 +203,7 @@
           <a:p>
             <a:fld id="{DD7A25D8-F173-4133-85F8-CB962D678EB5}" type="datetimeFigureOut">
               <a:rPr lang="de-DE" smtClean="0"/>
-              <a:t>22.12.21</a:t>
+              <a:t>07.01.22</a:t>
             </a:fld>
             <a:endParaRPr lang="de-DE"/>
           </a:p>
@@ -609,7 +609,7 @@
           <a:p>
             <a:fld id="{FC9269F9-6F79-4414-A84E-D81C6C443C37}" type="datetimeFigureOut">
               <a:rPr lang="de-DE" smtClean="0"/>
-              <a:t>22.12.21</a:t>
+              <a:t>07.01.22</a:t>
             </a:fld>
             <a:endParaRPr lang="de-DE"/>
           </a:p>
@@ -1438,7 +1438,10 @@
             <a:avLst/>
           </a:prstGeom>
           <a:solidFill>
-            <a:srgbClr val="47BEE9"/>
+            <a:schemeClr val="accent5">
+              <a:lumMod val="40000"/>
+              <a:lumOff val="60000"/>
+            </a:schemeClr>
           </a:solidFill>
           <a:ln>
             <a:noFill/>
@@ -1490,16 +1493,24 @@
           <a:bodyPr anchor="t"/>
           <a:lstStyle>
             <a:lvl1pPr>
-              <a:defRPr>
+              <a:defRPr b="0" cap="none" spc="0">
+                <a:ln w="0"/>
                 <a:solidFill>
-                  <a:schemeClr val="bg1"/>
+                  <a:schemeClr val="tx1"/>
                 </a:solidFill>
+                <a:effectLst>
+                  <a:outerShdw blurRad="38100" dist="19050" dir="2700000" algn="tl" rotWithShape="0">
+                    <a:schemeClr val="dk1">
+                      <a:alpha val="40000"/>
+                    </a:schemeClr>
+                  </a:outerShdw>
+                </a:effectLst>
               </a:defRPr>
             </a:lvl1pPr>
           </a:lstStyle>
           <a:p>
             <a:r>
-              <a:rPr lang="de-DE"/>
+              <a:rPr lang="de-DE" dirty="0"/>
               <a:t>Mastertitelformat bearbeiten</a:t>
             </a:r>
             <a:endParaRPr lang="en-US" dirty="0"/>
@@ -1729,10 +1740,18 @@
           <a:lstStyle>
             <a:lvl1pPr marL="0" indent="0">
               <a:buNone/>
-              <a:defRPr sz="1600" b="1">
+              <a:defRPr sz="1600" b="0" cap="none" spc="0">
+                <a:ln w="0"/>
                 <a:solidFill>
-                  <a:schemeClr val="bg1"/>
+                  <a:schemeClr val="tx1"/>
                 </a:solidFill>
+                <a:effectLst>
+                  <a:outerShdw blurRad="38100" dist="19050" dir="2700000" algn="tl" rotWithShape="0">
+                    <a:schemeClr val="dk1">
+                      <a:alpha val="40000"/>
+                    </a:schemeClr>
+                  </a:outerShdw>
+                </a:effectLst>
               </a:defRPr>
             </a:lvl1pPr>
           </a:lstStyle>
@@ -3656,7 +3675,10 @@
             <a:avLst/>
           </a:prstGeom>
           <a:solidFill>
-            <a:schemeClr val="accent3"/>
+            <a:schemeClr val="tx2">
+              <a:lumMod val="20000"/>
+              <a:lumOff val="80000"/>
+            </a:schemeClr>
           </a:solidFill>
           <a:ln>
             <a:noFill/>
@@ -3682,30 +3704,102 @@
           <a:p>
             <a:pPr algn="ctr"/>
             <a:r>
-              <a:rPr lang="de-DE" b="1" dirty="0"/>
+              <a:rPr lang="de-DE" b="0" cap="none" spc="0" dirty="0">
+                <a:ln w="0"/>
+                <a:solidFill>
+                  <a:schemeClr val="tx1"/>
+                </a:solidFill>
+                <a:effectLst>
+                  <a:outerShdw blurRad="38100" dist="19050" dir="2700000" algn="tl" rotWithShape="0">
+                    <a:schemeClr val="dk1">
+                      <a:alpha val="40000"/>
+                    </a:schemeClr>
+                  </a:outerShdw>
+                </a:effectLst>
+              </a:rPr>
               <a:t>Veröffentlicht</a:t>
             </a:r>
             <a:r>
-              <a:rPr lang="de-DE" b="1" baseline="0" dirty="0"/>
+              <a:rPr lang="de-DE" b="0" cap="none" spc="0" baseline="0" dirty="0">
+                <a:ln w="0"/>
+                <a:solidFill>
+                  <a:schemeClr val="tx1"/>
+                </a:solidFill>
+                <a:effectLst>
+                  <a:outerShdw blurRad="38100" dist="19050" dir="2700000" algn="tl" rotWithShape="0">
+                    <a:schemeClr val="dk1">
+                      <a:alpha val="40000"/>
+                    </a:schemeClr>
+                  </a:outerShdw>
+                </a:effectLst>
+              </a:rPr>
               <a:t> unter CC BY SA</a:t>
             </a:r>
           </a:p>
           <a:p>
             <a:pPr algn="ctr"/>
-            <a:endParaRPr lang="de-DE" b="0" baseline="0" dirty="0"/>
+            <a:endParaRPr lang="de-DE" b="0" cap="none" spc="0" baseline="0" dirty="0">
+              <a:ln w="0"/>
+              <a:solidFill>
+                <a:schemeClr val="tx1"/>
+              </a:solidFill>
+              <a:effectLst>
+                <a:outerShdw blurRad="38100" dist="19050" dir="2700000" algn="tl" rotWithShape="0">
+                  <a:schemeClr val="dk1">
+                    <a:alpha val="40000"/>
+                  </a:schemeClr>
+                </a:outerShdw>
+              </a:effectLst>
+            </a:endParaRPr>
           </a:p>
           <a:p>
             <a:pPr algn="ctr"/>
             <a:r>
-              <a:rPr lang="de-DE" b="0" dirty="0"/>
+              <a:rPr lang="de-DE" b="0" cap="none" spc="0" dirty="0">
+                <a:ln w="0"/>
+                <a:solidFill>
+                  <a:schemeClr val="tx1"/>
+                </a:solidFill>
+                <a:effectLst>
+                  <a:outerShdw blurRad="38100" dist="19050" dir="2700000" algn="tl" rotWithShape="0">
+                    <a:schemeClr val="dk1">
+                      <a:alpha val="40000"/>
+                    </a:schemeClr>
+                  </a:outerShdw>
+                </a:effectLst>
+              </a:rPr>
               <a:t>Dieses Werk ist unter einer Creative </a:t>
             </a:r>
             <a:r>
-              <a:rPr lang="de-DE" b="0" dirty="0" err="1"/>
+              <a:rPr lang="de-DE" b="0" cap="none" spc="0" dirty="0" err="1">
+                <a:ln w="0"/>
+                <a:solidFill>
+                  <a:schemeClr val="tx1"/>
+                </a:solidFill>
+                <a:effectLst>
+                  <a:outerShdw blurRad="38100" dist="19050" dir="2700000" algn="tl" rotWithShape="0">
+                    <a:schemeClr val="dk1">
+                      <a:alpha val="40000"/>
+                    </a:schemeClr>
+                  </a:outerShdw>
+                </a:effectLst>
+              </a:rPr>
               <a:t>Commons</a:t>
             </a:r>
             <a:r>
-              <a:rPr lang="de-DE" b="0" dirty="0"/>
+              <a:rPr lang="de-DE" b="0" cap="none" spc="0" dirty="0">
+                <a:ln w="0"/>
+                <a:solidFill>
+                  <a:schemeClr val="tx1"/>
+                </a:solidFill>
+                <a:effectLst>
+                  <a:outerShdw blurRad="38100" dist="19050" dir="2700000" algn="tl" rotWithShape="0">
+                    <a:schemeClr val="dk1">
+                      <a:alpha val="40000"/>
+                    </a:schemeClr>
+                  </a:outerShdw>
+                </a:effectLst>
+              </a:rPr>
               <a:t> Lizenz vom Typ Namensnennung - Weitergabe unter gleichen Bedingungen 4.0 International zugänglich. </a:t>
             </a:r>
           </a:p>
@@ -3990,7 +4084,7 @@
           <a:p>
             <a:fld id="{FC9269F9-6F79-4414-A84E-D81C6C443C37}" type="datetimeFigureOut">
               <a:rPr lang="de-DE" smtClean="0"/>
-              <a:t>22.12.21</a:t>
+              <a:t>07.01.22</a:t>
             </a:fld>
             <a:endParaRPr lang="de-DE"/>
           </a:p>
@@ -4383,7 +4477,7 @@
           <a:p>
             <a:fld id="{FC9269F9-6F79-4414-A84E-D81C6C443C37}" type="datetimeFigureOut">
               <a:rPr lang="de-DE" smtClean="0"/>
-              <a:t>22.12.21</a:t>
+              <a:t>07.01.22</a:t>
             </a:fld>
             <a:endParaRPr lang="de-DE"/>
           </a:p>
@@ -6270,7 +6364,10 @@
             <a:avLst/>
           </a:prstGeom>
           <a:solidFill>
-            <a:srgbClr val="47BEE9"/>
+            <a:schemeClr val="accent5">
+              <a:lumMod val="40000"/>
+              <a:lumOff val="60000"/>
+            </a:schemeClr>
           </a:solidFill>
         </p:spPr>
         <p:style>
@@ -7566,7 +7663,10 @@
             <a:avLst/>
           </a:prstGeom>
           <a:solidFill>
-            <a:srgbClr val="62BBA0"/>
+            <a:schemeClr val="accent4">
+              <a:lumMod val="60000"/>
+              <a:lumOff val="40000"/>
+            </a:schemeClr>
           </a:solidFill>
         </p:spPr>
         <p:style>

</xml_diff>